<commit_message>
update: 7 habits contents and further cleanup
Signed-off-by: Yong Yang <yangoliver@gmail.com>
</commit_message>
<xml_diff>
--- a/slides/2016/career_personal_dev.pptx
+++ b/slides/2016/career_personal_dev.pptx
@@ -14,12 +14,12 @@
     <p:sldId id="272" r:id="rId8"/>
     <p:sldId id="273" r:id="rId9"/>
     <p:sldId id="275" r:id="rId10"/>
-    <p:sldId id="274" r:id="rId11"/>
-    <p:sldId id="271" r:id="rId12"/>
-    <p:sldId id="266" r:id="rId13"/>
-    <p:sldId id="268" r:id="rId14"/>
-    <p:sldId id="264" r:id="rId15"/>
-    <p:sldId id="269" r:id="rId16"/>
+    <p:sldId id="277" r:id="rId11"/>
+    <p:sldId id="278" r:id="rId12"/>
+    <p:sldId id="271" r:id="rId13"/>
+    <p:sldId id="279" r:id="rId14"/>
+    <p:sldId id="266" r:id="rId15"/>
+    <p:sldId id="264" r:id="rId16"/>
     <p:sldId id="267" r:id="rId17"/>
   </p:sldIdLst>
   <p:sldSz cx="12192000" cy="6858000"/>
@@ -119,6 +119,11 @@
       </a:defRPr>
     </a:lvl9pPr>
   </p:defaultTextStyle>
+  <p:extLst>
+    <p:ext uri="{EFAFB233-063F-42B5-8137-9DF3F51BA10A}">
+      <p15:sldGuideLst xmlns:p15="http://schemas.microsoft.com/office/powerpoint/2012/main"/>
+    </p:ext>
+  </p:extLst>
 </p:presentation>
 </file>
 
@@ -1771,6 +1776,13 @@
     <dgm:pt modelId="{78837087-7B8C-0146-8879-6253650A5A69}" type="pres">
       <dgm:prSet presAssocID="{0279F204-0F2B-4F4A-B8A6-B305101486AE}" presName="circ1" presStyleLbl="vennNode1" presStyleIdx="0" presStyleCnt="3"/>
       <dgm:spPr/>
+      <dgm:t>
+        <a:bodyPr/>
+        <a:lstStyle/>
+        <a:p>
+          <a:endParaRPr lang="en-US"/>
+        </a:p>
+      </dgm:t>
     </dgm:pt>
     <dgm:pt modelId="{B331DE54-2B02-3542-9EE1-4762A3108198}" type="pres">
       <dgm:prSet presAssocID="{0279F204-0F2B-4F4A-B8A6-B305101486AE}" presName="circ1Tx" presStyleLbl="revTx" presStyleIdx="0" presStyleCnt="0">
@@ -1781,10 +1793,24 @@
         </dgm:presLayoutVars>
       </dgm:prSet>
       <dgm:spPr/>
+      <dgm:t>
+        <a:bodyPr/>
+        <a:lstStyle/>
+        <a:p>
+          <a:endParaRPr lang="en-US"/>
+        </a:p>
+      </dgm:t>
     </dgm:pt>
     <dgm:pt modelId="{CAA5A468-AECB-5145-81CB-3A3F8A68C2DB}" type="pres">
       <dgm:prSet presAssocID="{F36CCF77-2CB2-D54A-AFD8-CE95434CDA05}" presName="circ2" presStyleLbl="vennNode1" presStyleIdx="1" presStyleCnt="3"/>
       <dgm:spPr/>
+      <dgm:t>
+        <a:bodyPr/>
+        <a:lstStyle/>
+        <a:p>
+          <a:endParaRPr lang="en-US"/>
+        </a:p>
+      </dgm:t>
     </dgm:pt>
     <dgm:pt modelId="{F14EEBB8-7E7B-FC4A-9B4B-143DA39CAA9F}" type="pres">
       <dgm:prSet presAssocID="{F36CCF77-2CB2-D54A-AFD8-CE95434CDA05}" presName="circ2Tx" presStyleLbl="revTx" presStyleIdx="0" presStyleCnt="0">
@@ -1795,10 +1821,24 @@
         </dgm:presLayoutVars>
       </dgm:prSet>
       <dgm:spPr/>
+      <dgm:t>
+        <a:bodyPr/>
+        <a:lstStyle/>
+        <a:p>
+          <a:endParaRPr lang="en-US"/>
+        </a:p>
+      </dgm:t>
     </dgm:pt>
     <dgm:pt modelId="{E7FD3EBE-3ABE-7D41-A76F-4A62D02DB67E}" type="pres">
       <dgm:prSet presAssocID="{629E1B1C-65B8-B445-ABAB-0F056E9E939D}" presName="circ3" presStyleLbl="vennNode1" presStyleIdx="2" presStyleCnt="3"/>
       <dgm:spPr/>
+      <dgm:t>
+        <a:bodyPr/>
+        <a:lstStyle/>
+        <a:p>
+          <a:endParaRPr lang="en-US"/>
+        </a:p>
+      </dgm:t>
     </dgm:pt>
     <dgm:pt modelId="{9359F898-391F-1040-BCD9-E9D88C208EB9}" type="pres">
       <dgm:prSet presAssocID="{629E1B1C-65B8-B445-ABAB-0F056E9E939D}" presName="circ3Tx" presStyleLbl="revTx" presStyleIdx="0" presStyleCnt="0">
@@ -1809,6 +1849,13 @@
         </dgm:presLayoutVars>
       </dgm:prSet>
       <dgm:spPr/>
+      <dgm:t>
+        <a:bodyPr/>
+        <a:lstStyle/>
+        <a:p>
+          <a:endParaRPr lang="en-US"/>
+        </a:p>
+      </dgm:t>
     </dgm:pt>
   </dgm:ptLst>
   <dgm:cxnLst>
@@ -1994,6 +2041,13 @@
     <dgm:pt modelId="{78837087-7B8C-0146-8879-6253650A5A69}" type="pres">
       <dgm:prSet presAssocID="{0279F204-0F2B-4F4A-B8A6-B305101486AE}" presName="circ1" presStyleLbl="vennNode1" presStyleIdx="0" presStyleCnt="3"/>
       <dgm:spPr/>
+      <dgm:t>
+        <a:bodyPr/>
+        <a:lstStyle/>
+        <a:p>
+          <a:endParaRPr lang="en-US"/>
+        </a:p>
+      </dgm:t>
     </dgm:pt>
     <dgm:pt modelId="{B331DE54-2B02-3542-9EE1-4762A3108198}" type="pres">
       <dgm:prSet presAssocID="{0279F204-0F2B-4F4A-B8A6-B305101486AE}" presName="circ1Tx" presStyleLbl="revTx" presStyleIdx="0" presStyleCnt="0">
@@ -2004,10 +2058,24 @@
         </dgm:presLayoutVars>
       </dgm:prSet>
       <dgm:spPr/>
+      <dgm:t>
+        <a:bodyPr/>
+        <a:lstStyle/>
+        <a:p>
+          <a:endParaRPr lang="en-US"/>
+        </a:p>
+      </dgm:t>
     </dgm:pt>
     <dgm:pt modelId="{CAA5A468-AECB-5145-81CB-3A3F8A68C2DB}" type="pres">
       <dgm:prSet presAssocID="{F36CCF77-2CB2-D54A-AFD8-CE95434CDA05}" presName="circ2" presStyleLbl="vennNode1" presStyleIdx="1" presStyleCnt="3"/>
       <dgm:spPr/>
+      <dgm:t>
+        <a:bodyPr/>
+        <a:lstStyle/>
+        <a:p>
+          <a:endParaRPr lang="en-US"/>
+        </a:p>
+      </dgm:t>
     </dgm:pt>
     <dgm:pt modelId="{F14EEBB8-7E7B-FC4A-9B4B-143DA39CAA9F}" type="pres">
       <dgm:prSet presAssocID="{F36CCF77-2CB2-D54A-AFD8-CE95434CDA05}" presName="circ2Tx" presStyleLbl="revTx" presStyleIdx="0" presStyleCnt="0">
@@ -2018,10 +2086,24 @@
         </dgm:presLayoutVars>
       </dgm:prSet>
       <dgm:spPr/>
+      <dgm:t>
+        <a:bodyPr/>
+        <a:lstStyle/>
+        <a:p>
+          <a:endParaRPr lang="en-US"/>
+        </a:p>
+      </dgm:t>
     </dgm:pt>
     <dgm:pt modelId="{E7FD3EBE-3ABE-7D41-A76F-4A62D02DB67E}" type="pres">
       <dgm:prSet presAssocID="{629E1B1C-65B8-B445-ABAB-0F056E9E939D}" presName="circ3" presStyleLbl="vennNode1" presStyleIdx="2" presStyleCnt="3"/>
       <dgm:spPr/>
+      <dgm:t>
+        <a:bodyPr/>
+        <a:lstStyle/>
+        <a:p>
+          <a:endParaRPr lang="en-US"/>
+        </a:p>
+      </dgm:t>
     </dgm:pt>
     <dgm:pt modelId="{9359F898-391F-1040-BCD9-E9D88C208EB9}" type="pres">
       <dgm:prSet presAssocID="{629E1B1C-65B8-B445-ABAB-0F056E9E939D}" presName="circ3Tx" presStyleLbl="revTx" presStyleIdx="0" presStyleCnt="0">
@@ -2032,25 +2114,32 @@
         </dgm:presLayoutVars>
       </dgm:prSet>
       <dgm:spPr/>
+      <dgm:t>
+        <a:bodyPr/>
+        <a:lstStyle/>
+        <a:p>
+          <a:endParaRPr lang="en-US"/>
+        </a:p>
+      </dgm:t>
     </dgm:pt>
   </dgm:ptLst>
   <dgm:cxnLst>
-    <dgm:cxn modelId="{91282556-0DBB-104A-A409-6CD3144EE6C3}" type="presOf" srcId="{0279F204-0F2B-4F4A-B8A6-B305101486AE}" destId="{78837087-7B8C-0146-8879-6253650A5A69}" srcOrd="0" destOrd="0" presId="urn:microsoft.com/office/officeart/2005/8/layout/venn1"/>
+    <dgm:cxn modelId="{83DF5E14-4F1E-2C4F-88F9-EEECB2F3FF2D}" type="presOf" srcId="{F58C2C3A-9184-E942-8884-7A1258361068}" destId="{5BD87C89-D733-0642-9DDB-D027F1421273}" srcOrd="0" destOrd="0" presId="urn:microsoft.com/office/officeart/2005/8/layout/venn1"/>
+    <dgm:cxn modelId="{98C95E05-9369-6C4D-96DA-1F24E6822A77}" type="presOf" srcId="{0279F204-0F2B-4F4A-B8A6-B305101486AE}" destId="{B331DE54-2B02-3542-9EE1-4762A3108198}" srcOrd="1" destOrd="0" presId="urn:microsoft.com/office/officeart/2005/8/layout/venn1"/>
+    <dgm:cxn modelId="{00FDD701-AE82-FB43-B175-BE97AD6FF229}" type="presOf" srcId="{629E1B1C-65B8-B445-ABAB-0F056E9E939D}" destId="{E7FD3EBE-3ABE-7D41-A76F-4A62D02DB67E}" srcOrd="0" destOrd="0" presId="urn:microsoft.com/office/officeart/2005/8/layout/venn1"/>
+    <dgm:cxn modelId="{2E6ECC33-6B6C-6E4D-A353-E9DF26B2951D}" type="presOf" srcId="{0279F204-0F2B-4F4A-B8A6-B305101486AE}" destId="{78837087-7B8C-0146-8879-6253650A5A69}" srcOrd="0" destOrd="0" presId="urn:microsoft.com/office/officeart/2005/8/layout/venn1"/>
     <dgm:cxn modelId="{1B17CA11-6333-714E-B570-D583C8A5ADA7}" srcId="{F58C2C3A-9184-E942-8884-7A1258361068}" destId="{629E1B1C-65B8-B445-ABAB-0F056E9E939D}" srcOrd="2" destOrd="0" parTransId="{9091CC39-903C-8547-AFA4-9CAE5E6DA1A9}" sibTransId="{8AA9EC92-79F1-2F4E-8F91-16BAB15098FD}"/>
-    <dgm:cxn modelId="{E7626CD1-EE06-354D-B206-A71A6F9A4469}" type="presOf" srcId="{F36CCF77-2CB2-D54A-AFD8-CE95434CDA05}" destId="{F14EEBB8-7E7B-FC4A-9B4B-143DA39CAA9F}" srcOrd="1" destOrd="0" presId="urn:microsoft.com/office/officeart/2005/8/layout/venn1"/>
-    <dgm:cxn modelId="{E05733E0-E3A1-1646-81DE-5BD9E8AEC4B3}" type="presOf" srcId="{F36CCF77-2CB2-D54A-AFD8-CE95434CDA05}" destId="{CAA5A468-AECB-5145-81CB-3A3F8A68C2DB}" srcOrd="0" destOrd="0" presId="urn:microsoft.com/office/officeart/2005/8/layout/venn1"/>
-    <dgm:cxn modelId="{F1D6FE2E-636A-6640-96A2-C1FAE00A11DA}" type="presOf" srcId="{629E1B1C-65B8-B445-ABAB-0F056E9E939D}" destId="{9359F898-391F-1040-BCD9-E9D88C208EB9}" srcOrd="1" destOrd="0" presId="urn:microsoft.com/office/officeart/2005/8/layout/venn1"/>
-    <dgm:cxn modelId="{C12F1ECC-AD5F-C84C-8F82-9F1C9691A277}" type="presOf" srcId="{F58C2C3A-9184-E942-8884-7A1258361068}" destId="{5BD87C89-D733-0642-9DDB-D027F1421273}" srcOrd="0" destOrd="0" presId="urn:microsoft.com/office/officeart/2005/8/layout/venn1"/>
-    <dgm:cxn modelId="{4EFA06D4-0245-334A-BB66-660E00275892}" type="presOf" srcId="{0279F204-0F2B-4F4A-B8A6-B305101486AE}" destId="{B331DE54-2B02-3542-9EE1-4762A3108198}" srcOrd="1" destOrd="0" presId="urn:microsoft.com/office/officeart/2005/8/layout/venn1"/>
-    <dgm:cxn modelId="{FAFDEBA4-DB0A-E64F-B794-78E6FD4E1874}" type="presOf" srcId="{629E1B1C-65B8-B445-ABAB-0F056E9E939D}" destId="{E7FD3EBE-3ABE-7D41-A76F-4A62D02DB67E}" srcOrd="0" destOrd="0" presId="urn:microsoft.com/office/officeart/2005/8/layout/venn1"/>
+    <dgm:cxn modelId="{42A06F03-5EFE-CE4C-8E79-3B775C1D8FDB}" type="presOf" srcId="{F36CCF77-2CB2-D54A-AFD8-CE95434CDA05}" destId="{CAA5A468-AECB-5145-81CB-3A3F8A68C2DB}" srcOrd="0" destOrd="0" presId="urn:microsoft.com/office/officeart/2005/8/layout/venn1"/>
+    <dgm:cxn modelId="{BC4DDF53-69B1-A646-BFA8-6BB97EF5A78F}" type="presOf" srcId="{629E1B1C-65B8-B445-ABAB-0F056E9E939D}" destId="{9359F898-391F-1040-BCD9-E9D88C208EB9}" srcOrd="1" destOrd="0" presId="urn:microsoft.com/office/officeart/2005/8/layout/venn1"/>
     <dgm:cxn modelId="{1963879C-2ADA-324F-AEB0-E0C347C0EAAB}" srcId="{F58C2C3A-9184-E942-8884-7A1258361068}" destId="{F36CCF77-2CB2-D54A-AFD8-CE95434CDA05}" srcOrd="1" destOrd="0" parTransId="{23D37548-B269-B642-BD33-F649BF13CF27}" sibTransId="{4688A228-409B-4949-8556-2A22FE078901}"/>
     <dgm:cxn modelId="{BDCFFAAE-DC32-3142-8321-7CC78A79F681}" srcId="{F58C2C3A-9184-E942-8884-7A1258361068}" destId="{0279F204-0F2B-4F4A-B8A6-B305101486AE}" srcOrd="0" destOrd="0" parTransId="{D597DEB3-141E-D844-B6EA-310A3C52EBAB}" sibTransId="{364708CD-F19C-CD46-A0A4-77C49B9D7A47}"/>
-    <dgm:cxn modelId="{8DDE6A6B-F2A2-9C4F-9B12-7DC0FB96EAD1}" type="presParOf" srcId="{5BD87C89-D733-0642-9DDB-D027F1421273}" destId="{78837087-7B8C-0146-8879-6253650A5A69}" srcOrd="0" destOrd="0" presId="urn:microsoft.com/office/officeart/2005/8/layout/venn1"/>
-    <dgm:cxn modelId="{F8C62453-F96E-F447-8107-652580BA8DDA}" type="presParOf" srcId="{5BD87C89-D733-0642-9DDB-D027F1421273}" destId="{B331DE54-2B02-3542-9EE1-4762A3108198}" srcOrd="1" destOrd="0" presId="urn:microsoft.com/office/officeart/2005/8/layout/venn1"/>
-    <dgm:cxn modelId="{D8CA8344-F84C-B34A-AE4C-1C15562B166A}" type="presParOf" srcId="{5BD87C89-D733-0642-9DDB-D027F1421273}" destId="{CAA5A468-AECB-5145-81CB-3A3F8A68C2DB}" srcOrd="2" destOrd="0" presId="urn:microsoft.com/office/officeart/2005/8/layout/venn1"/>
-    <dgm:cxn modelId="{639A727A-A4C2-174F-8E6C-15EA73970BFE}" type="presParOf" srcId="{5BD87C89-D733-0642-9DDB-D027F1421273}" destId="{F14EEBB8-7E7B-FC4A-9B4B-143DA39CAA9F}" srcOrd="3" destOrd="0" presId="urn:microsoft.com/office/officeart/2005/8/layout/venn1"/>
-    <dgm:cxn modelId="{38965FEA-DF2A-CA45-84CD-9BA42F3BD542}" type="presParOf" srcId="{5BD87C89-D733-0642-9DDB-D027F1421273}" destId="{E7FD3EBE-3ABE-7D41-A76F-4A62D02DB67E}" srcOrd="4" destOrd="0" presId="urn:microsoft.com/office/officeart/2005/8/layout/venn1"/>
-    <dgm:cxn modelId="{AADEA7C4-36E4-8541-8F81-C710EA95F403}" type="presParOf" srcId="{5BD87C89-D733-0642-9DDB-D027F1421273}" destId="{9359F898-391F-1040-BCD9-E9D88C208EB9}" srcOrd="5" destOrd="0" presId="urn:microsoft.com/office/officeart/2005/8/layout/venn1"/>
+    <dgm:cxn modelId="{4840688E-8D64-0349-AD84-5A6C202C405C}" type="presOf" srcId="{F36CCF77-2CB2-D54A-AFD8-CE95434CDA05}" destId="{F14EEBB8-7E7B-FC4A-9B4B-143DA39CAA9F}" srcOrd="1" destOrd="0" presId="urn:microsoft.com/office/officeart/2005/8/layout/venn1"/>
+    <dgm:cxn modelId="{603C9A8E-AFF2-BA46-95A9-D44A9B04032B}" type="presParOf" srcId="{5BD87C89-D733-0642-9DDB-D027F1421273}" destId="{78837087-7B8C-0146-8879-6253650A5A69}" srcOrd="0" destOrd="0" presId="urn:microsoft.com/office/officeart/2005/8/layout/venn1"/>
+    <dgm:cxn modelId="{68959E29-1ED7-9B4B-9D8C-BDA91A21EA85}" type="presParOf" srcId="{5BD87C89-D733-0642-9DDB-D027F1421273}" destId="{B331DE54-2B02-3542-9EE1-4762A3108198}" srcOrd="1" destOrd="0" presId="urn:microsoft.com/office/officeart/2005/8/layout/venn1"/>
+    <dgm:cxn modelId="{4FB1B8AA-411C-9247-992A-C24ECAD7845B}" type="presParOf" srcId="{5BD87C89-D733-0642-9DDB-D027F1421273}" destId="{CAA5A468-AECB-5145-81CB-3A3F8A68C2DB}" srcOrd="2" destOrd="0" presId="urn:microsoft.com/office/officeart/2005/8/layout/venn1"/>
+    <dgm:cxn modelId="{85F22E1F-2B31-004F-BA34-CD2C19B2C66D}" type="presParOf" srcId="{5BD87C89-D733-0642-9DDB-D027F1421273}" destId="{F14EEBB8-7E7B-FC4A-9B4B-143DA39CAA9F}" srcOrd="3" destOrd="0" presId="urn:microsoft.com/office/officeart/2005/8/layout/venn1"/>
+    <dgm:cxn modelId="{EC0EDD00-F171-CD44-BAED-5459A31DE295}" type="presParOf" srcId="{5BD87C89-D733-0642-9DDB-D027F1421273}" destId="{E7FD3EBE-3ABE-7D41-A76F-4A62D02DB67E}" srcOrd="4" destOrd="0" presId="urn:microsoft.com/office/officeart/2005/8/layout/venn1"/>
+    <dgm:cxn modelId="{54DEC495-B3C5-FD4D-B1D4-9EACA4D96F94}" type="presParOf" srcId="{5BD87C89-D733-0642-9DDB-D027F1421273}" destId="{9359F898-391F-1040-BCD9-E9D88C208EB9}" srcOrd="5" destOrd="0" presId="urn:microsoft.com/office/officeart/2005/8/layout/venn1"/>
   </dgm:cxnLst>
   <dgm:bg/>
   <dgm:whole/>
@@ -6631,7 +6720,7 @@
           <a:p>
             <a:fld id="{48A87A34-81AB-432B-8DAE-1953F412C126}" type="datetimeFigureOut">
               <a:rPr lang="en-US" smtClean="0"/>
-              <a:t>1/2/17</a:t>
+              <a:t>1/3/17</a:t>
             </a:fld>
             <a:endParaRPr lang="en-US" dirty="0"/>
           </a:p>
@@ -6842,7 +6931,7 @@
           <a:p>
             <a:fld id="{48A87A34-81AB-432B-8DAE-1953F412C126}" type="datetimeFigureOut">
               <a:rPr lang="en-US" smtClean="0"/>
-              <a:t>1/2/17</a:t>
+              <a:t>1/3/17</a:t>
             </a:fld>
             <a:endParaRPr lang="en-US" dirty="0"/>
           </a:p>
@@ -7057,7 +7146,7 @@
           <a:p>
             <a:fld id="{48A87A34-81AB-432B-8DAE-1953F412C126}" type="datetimeFigureOut">
               <a:rPr lang="en-US" smtClean="0"/>
-              <a:t>1/2/17</a:t>
+              <a:t>1/3/17</a:t>
             </a:fld>
             <a:endParaRPr lang="en-US" dirty="0"/>
           </a:p>
@@ -7258,7 +7347,7 @@
           <a:p>
             <a:fld id="{48A87A34-81AB-432B-8DAE-1953F412C126}" type="datetimeFigureOut">
               <a:rPr lang="en-US" smtClean="0"/>
-              <a:t>1/2/17</a:t>
+              <a:t>1/3/17</a:t>
             </a:fld>
             <a:endParaRPr lang="en-US" dirty="0"/>
           </a:p>
@@ -7537,7 +7626,7 @@
           <a:p>
             <a:fld id="{48A87A34-81AB-432B-8DAE-1953F412C126}" type="datetimeFigureOut">
               <a:rPr lang="en-US" smtClean="0"/>
-              <a:t>1/2/17</a:t>
+              <a:t>1/3/17</a:t>
             </a:fld>
             <a:endParaRPr lang="en-US" dirty="0"/>
           </a:p>
@@ -7805,7 +7894,7 @@
           <a:p>
             <a:fld id="{48A87A34-81AB-432B-8DAE-1953F412C126}" type="datetimeFigureOut">
               <a:rPr lang="en-US" smtClean="0"/>
-              <a:t>1/2/17</a:t>
+              <a:t>1/3/17</a:t>
             </a:fld>
             <a:endParaRPr lang="en-US" dirty="0"/>
           </a:p>
@@ -8221,7 +8310,7 @@
           <a:p>
             <a:fld id="{48A87A34-81AB-432B-8DAE-1953F412C126}" type="datetimeFigureOut">
               <a:rPr lang="en-US" smtClean="0"/>
-              <a:t>1/2/17</a:t>
+              <a:t>1/3/17</a:t>
             </a:fld>
             <a:endParaRPr lang="en-US" dirty="0"/>
           </a:p>
@@ -8370,7 +8459,7 @@
           <a:p>
             <a:fld id="{48A87A34-81AB-432B-8DAE-1953F412C126}" type="datetimeFigureOut">
               <a:rPr lang="en-US" smtClean="0"/>
-              <a:t>1/2/17</a:t>
+              <a:t>1/3/17</a:t>
             </a:fld>
             <a:endParaRPr lang="en-US" dirty="0"/>
           </a:p>
@@ -8496,7 +8585,7 @@
           <a:p>
             <a:fld id="{48A87A34-81AB-432B-8DAE-1953F412C126}" type="datetimeFigureOut">
               <a:rPr lang="en-US" smtClean="0"/>
-              <a:t>1/2/17</a:t>
+              <a:t>1/3/17</a:t>
             </a:fld>
             <a:endParaRPr lang="en-US" dirty="0"/>
           </a:p>
@@ -8747,7 +8836,7 @@
           <a:p>
             <a:fld id="{48A87A34-81AB-432B-8DAE-1953F412C126}" type="datetimeFigureOut">
               <a:rPr lang="en-US" smtClean="0"/>
-              <a:t>1/2/17</a:t>
+              <a:t>1/3/17</a:t>
             </a:fld>
             <a:endParaRPr lang="en-US" dirty="0"/>
           </a:p>
@@ -9193,7 +9282,7 @@
             <a:fld id="{48A87A34-81AB-432B-8DAE-1953F412C126}" type="datetimeFigureOut">
               <a:rPr lang="en-US" smtClean="0"/>
               <a:pPr/>
-              <a:t>1/2/17</a:t>
+              <a:t>1/3/17</a:t>
             </a:fld>
             <a:endParaRPr lang="en-US" dirty="0"/>
           </a:p>
@@ -9525,7 +9614,7 @@
             <a:fld id="{48A87A34-81AB-432B-8DAE-1953F412C126}" type="datetimeFigureOut">
               <a:rPr lang="en-US" smtClean="0"/>
               <a:pPr/>
-              <a:t>1/2/17</a:t>
+              <a:t>1/3/17</a:t>
             </a:fld>
             <a:endParaRPr lang="en-US" dirty="0"/>
           </a:p>
@@ -10135,13 +10224,7 @@
               <a:rPr lang="en-US" dirty="0" smtClean="0">
                 <a:hlinkClick r:id="rId2"/>
               </a:rPr>
-              <a:t>ttp://</a:t>
-            </a:r>
-            <a:r>
-              <a:rPr lang="en-US" dirty="0" err="1" smtClean="0">
-                <a:hlinkClick r:id="rId2"/>
-              </a:rPr>
-              <a:t>oliveryang.net</a:t>
+              <a:t>ttp://oliveryang.net</a:t>
             </a:r>
             <a:endParaRPr lang="en-US" dirty="0"/>
           </a:p>
@@ -10200,22 +10283,18 @@
           <a:lstStyle/>
           <a:p>
             <a:r>
-              <a:rPr lang="zh-CN" altLang="en-US" dirty="0" smtClean="0"/>
-              <a:t>笃信</a:t>
-            </a:r>
-            <a:r>
               <a:rPr lang="zh-CN" altLang="en-US" dirty="0" smtClean="0">
                 <a:solidFill>
                   <a:srgbClr val="FF0000"/>
                 </a:solidFill>
               </a:rPr>
-              <a:t>法则</a:t>
-            </a:r>
-            <a:endParaRPr lang="en-US" dirty="0">
-              <a:solidFill>
-                <a:srgbClr val="FF0000"/>
-              </a:solidFill>
-            </a:endParaRPr>
+              <a:t>关爱</a:t>
+            </a:r>
+            <a:r>
+              <a:rPr lang="zh-CN" altLang="en-US" dirty="0" smtClean="0"/>
+              <a:t>自己</a:t>
+            </a:r>
+            <a:endParaRPr lang="en-US" dirty="0"/>
           </a:p>
         </p:txBody>
       </p:sp>
@@ -10231,108 +10310,195 @@
         </p:nvSpPr>
         <p:spPr/>
         <p:txBody>
-          <a:bodyPr/>
+          <a:bodyPr>
+            <a:normAutofit fontScale="92500" lnSpcReduction="20000"/>
+          </a:bodyPr>
           <a:lstStyle/>
           <a:p>
             <a:r>
               <a:rPr lang="zh-CN" altLang="en-US" dirty="0" smtClean="0"/>
-              <a:t>选择和做决定的法则</a:t>
-            </a:r>
-            <a:r>
-              <a:rPr lang="is-IS" altLang="zh-CN" dirty="0" smtClean="0"/>
-              <a:t>…</a:t>
+              <a:t>理解 </a:t>
+            </a:r>
+            <a:r>
+              <a:rPr lang="zh-CN" altLang="en-US" dirty="0" smtClean="0">
+                <a:hlinkClick r:id="rId2"/>
+              </a:rPr>
+              <a:t>帕金森定律 </a:t>
+            </a:r>
+            <a:r>
+              <a:rPr lang="zh-CN" altLang="en-US" dirty="0" smtClean="0"/>
+              <a:t>和 </a:t>
+            </a:r>
+            <a:r>
+              <a:rPr lang="zh-CN" altLang="en-US" dirty="0" smtClean="0">
+                <a:hlinkClick r:id="rId3"/>
+              </a:rPr>
+              <a:t>帕金森琐碎定律</a:t>
             </a:r>
             <a:endParaRPr lang="en-US" altLang="zh-CN" dirty="0" smtClean="0"/>
           </a:p>
           <a:p>
+            <a:r>
+              <a:rPr lang="zh-CN" altLang="en-US" dirty="0" smtClean="0"/>
+              <a:t>留出时间关爱自己，做对自己真正重要的事情</a:t>
+            </a:r>
+            <a:endParaRPr lang="en-US" altLang="zh-CN" dirty="0" smtClean="0"/>
+          </a:p>
+          <a:p>
             <a:pPr lvl="1"/>
             <a:r>
-              <a:rPr lang="zh-CN" altLang="en-US" dirty="0" smtClean="0"/>
-              <a:t>离开舒适区，处理好痛苦，而不是逃避痛苦</a:t>
+              <a:rPr lang="en-US" altLang="zh-CN" dirty="0" smtClean="0"/>
+              <a:t>Value </a:t>
+            </a:r>
+            <a:r>
+              <a:rPr lang="zh-CN" altLang="en-US" dirty="0" smtClean="0"/>
+              <a:t>价值观</a:t>
             </a:r>
             <a:endParaRPr lang="en-US" altLang="zh-CN" dirty="0" smtClean="0"/>
           </a:p>
           <a:p>
+            <a:pPr lvl="2"/>
+            <a:r>
+              <a:rPr lang="zh-CN" altLang="en-US" dirty="0" smtClean="0"/>
+              <a:t>理想：选择和决策的方向</a:t>
+            </a:r>
+            <a:endParaRPr lang="en-US" altLang="zh-CN" dirty="0" smtClean="0"/>
+          </a:p>
+          <a:p>
             <a:pPr lvl="1"/>
             <a:r>
-              <a:rPr lang="zh-CN" altLang="en-US" dirty="0" smtClean="0"/>
-              <a:t>对自己诚实，直面现实，而不逃避现实</a:t>
+              <a:rPr lang="en-US" dirty="0" smtClean="0"/>
+              <a:t>Principle </a:t>
+            </a:r>
+            <a:r>
+              <a:rPr lang="zh-CN" altLang="en-US" dirty="0" smtClean="0"/>
+              <a:t>法则</a:t>
             </a:r>
             <a:endParaRPr lang="en-US" altLang="zh-CN" dirty="0" smtClean="0"/>
           </a:p>
           <a:p>
+            <a:pPr lvl="2"/>
+            <a:r>
+              <a:rPr lang="zh-CN" altLang="en-US" dirty="0" smtClean="0"/>
+              <a:t>现实：选择和决策的正确性</a:t>
+            </a:r>
+            <a:endParaRPr lang="en-US" altLang="zh-CN" dirty="0" smtClean="0"/>
+          </a:p>
+          <a:p>
             <a:pPr lvl="1"/>
             <a:r>
-              <a:rPr lang="zh-CN" altLang="en-US" dirty="0" smtClean="0"/>
-              <a:t>抛开面子，追求好的目标，而不是好的表现</a:t>
-            </a:r>
-            <a:endParaRPr lang="en-US" altLang="zh-CN" dirty="0" smtClean="0"/>
-          </a:p>
-          <a:p>
-            <a:pPr lvl="1"/>
-            <a:r>
-              <a:rPr lang="zh-CN" altLang="en-US" dirty="0" smtClean="0"/>
-              <a:t>平衡短期与长期，基于长期效益做决策，而不是只看短期利益</a:t>
-            </a:r>
-            <a:endParaRPr lang="en-US" altLang="zh-CN" dirty="0" smtClean="0"/>
-          </a:p>
-          <a:p>
-            <a:pPr lvl="1"/>
-            <a:r>
-              <a:rPr lang="zh-CN" altLang="en-US" dirty="0" smtClean="0"/>
-              <a:t>对自己负责，对自己做事的结果负责，而不是将责任推给他人</a:t>
+              <a:rPr lang="en-US" altLang="zh-CN" dirty="0" smtClean="0"/>
+              <a:t>Characters </a:t>
+            </a:r>
+            <a:r>
+              <a:rPr lang="zh-CN" altLang="en-US" dirty="0" smtClean="0"/>
+              <a:t>性格</a:t>
             </a:r>
             <a:endParaRPr lang="en-US" altLang="zh-CN" dirty="0"/>
           </a:p>
           <a:p>
-            <a:pPr lvl="1"/>
+            <a:pPr lvl="2"/>
+            <a:r>
+              <a:rPr lang="zh-CN" altLang="en-US" dirty="0" smtClean="0"/>
+              <a:t>落地：习惯和行动的效率</a:t>
+            </a:r>
             <a:endParaRPr lang="en-US" altLang="zh-CN" dirty="0"/>
           </a:p>
           <a:p>
-            <a:pPr marL="457200" lvl="1" indent="0">
+            <a:r>
+              <a:rPr lang="zh-CN" altLang="en-US" dirty="0" smtClean="0"/>
+              <a:t>案例：</a:t>
+            </a:r>
+            <a:r>
+              <a:rPr lang="zh-CN" altLang="en-US" dirty="0"/>
+              <a:t>以法则为中心的</a:t>
+            </a:r>
+            <a:r>
+              <a:rPr lang="zh-CN" altLang="en-US" dirty="0" smtClean="0"/>
+              <a:t>价值观</a:t>
+            </a:r>
+            <a:endParaRPr lang="en-US" altLang="zh-CN" dirty="0"/>
+          </a:p>
+          <a:p>
+            <a:pPr marL="0" indent="0">
               <a:buNone/>
             </a:pPr>
             <a:r>
-              <a:rPr lang="zh-CN" altLang="en-US" dirty="0" smtClean="0"/>
-              <a:t>以上法则摘自 </a:t>
-            </a:r>
-            <a:r>
-              <a:rPr lang="en-US" altLang="zh-CN" dirty="0" smtClean="0"/>
-              <a:t>《</a:t>
-            </a:r>
-            <a:r>
-              <a:rPr lang="en-US" altLang="zh-CN" dirty="0" smtClean="0">
-                <a:hlinkClick r:id="rId2"/>
+              <a:rPr lang="zh-CN" altLang="en-US" sz="1500" dirty="0" smtClean="0"/>
+              <a:t>推荐阅读：</a:t>
+            </a:r>
+            <a:r>
+              <a:rPr lang="en-US" altLang="zh-CN" sz="1500" dirty="0" smtClean="0">
+                <a:hlinkClick r:id="rId4"/>
               </a:rPr>
-              <a:t>PRINCIPLES</a:t>
-            </a:r>
-            <a:r>
-              <a:rPr lang="en-US" altLang="zh-CN" dirty="0" smtClean="0"/>
-              <a:t>》 by </a:t>
-            </a:r>
-            <a:r>
-              <a:rPr lang="en-US" altLang="zh-CN" dirty="0" smtClean="0">
-                <a:hlinkClick r:id="rId3"/>
+              <a:t>The </a:t>
+            </a:r>
+            <a:r>
+              <a:rPr lang="en-US" altLang="zh-CN" sz="1500" dirty="0">
+                <a:hlinkClick r:id="rId4"/>
               </a:rPr>
-              <a:t>Ray </a:t>
-            </a:r>
-            <a:r>
-              <a:rPr lang="en-US" altLang="zh-CN" dirty="0" err="1" smtClean="0">
-                <a:hlinkClick r:id="rId3"/>
+              <a:t>7 Habits of Highly Effective People</a:t>
+            </a:r>
+            <a:r>
+              <a:rPr lang="zh-CN" altLang="en-US" sz="1500" dirty="0"/>
+              <a:t> </a:t>
+            </a:r>
+            <a:r>
+              <a:rPr lang="en-US" altLang="zh-CN" sz="1500" dirty="0"/>
+              <a:t>by </a:t>
+            </a:r>
+            <a:r>
+              <a:rPr lang="en-US" altLang="zh-CN" sz="1500" dirty="0">
+                <a:hlinkClick r:id="rId5"/>
               </a:rPr>
-              <a:t>Dalio</a:t>
-            </a:r>
+              <a:t>Stephen Covey</a:t>
+            </a:r>
+            <a:endParaRPr lang="en-US" altLang="zh-CN" sz="1500" dirty="0"/>
+          </a:p>
+          <a:p>
+            <a:pPr lvl="1"/>
             <a:endParaRPr lang="en-US" altLang="zh-CN" dirty="0" smtClean="0"/>
           </a:p>
           <a:p>
-            <a:endParaRPr lang="en-US" altLang="zh-CN" dirty="0" smtClean="0"/>
+            <a:pPr lvl="1"/>
+            <a:endParaRPr lang="en-US" dirty="0"/>
           </a:p>
         </p:txBody>
       </p:sp>
+      <p:pic>
+        <p:nvPicPr>
+          <p:cNvPr id="4" name="Picture 3"/>
+          <p:cNvPicPr>
+            <a:picLocks noChangeAspect="1"/>
+          </p:cNvPicPr>
+          <p:nvPr/>
+        </p:nvPicPr>
+        <p:blipFill>
+          <a:blip r:embed="rId6">
+            <a:extLst>
+              <a:ext uri="{28A0092B-C50C-407E-A947-70E740481C1C}">
+                <a14:useLocalDpi xmlns:a14="http://schemas.microsoft.com/office/drawing/2010/main" val="0"/>
+              </a:ext>
+            </a:extLst>
+          </a:blip>
+          <a:stretch>
+            <a:fillRect/>
+          </a:stretch>
+        </p:blipFill>
+        <p:spPr>
+          <a:xfrm>
+            <a:off x="7030197" y="1932607"/>
+            <a:ext cx="4000912" cy="3960742"/>
+          </a:xfrm>
+          <a:prstGeom prst="rect">
+            <a:avLst/>
+          </a:prstGeom>
+        </p:spPr>
+      </p:pic>
     </p:spTree>
     <p:extLst>
       <p:ext uri="{BB962C8B-B14F-4D97-AF65-F5344CB8AC3E}">
-        <p14:creationId xmlns:p14="http://schemas.microsoft.com/office/powerpoint/2010/main" val="792139207"/>
+        <p14:creationId xmlns:p14="http://schemas.microsoft.com/office/powerpoint/2010/main" val="1225265690"/>
       </p:ext>
     </p:extLst>
   </p:cSld>
@@ -10382,22 +10548,18 @@
           <a:lstStyle/>
           <a:p>
             <a:r>
-              <a:rPr lang="zh-CN" altLang="en-US" dirty="0" smtClean="0"/>
-              <a:t>实现</a:t>
-            </a:r>
-            <a:r>
               <a:rPr lang="zh-CN" altLang="en-US" dirty="0" smtClean="0">
                 <a:solidFill>
                   <a:srgbClr val="FF0000"/>
                 </a:solidFill>
               </a:rPr>
-              <a:t>价值</a:t>
-            </a:r>
-            <a:endParaRPr lang="en-US" dirty="0">
-              <a:solidFill>
-                <a:srgbClr val="FF0000"/>
-              </a:solidFill>
-            </a:endParaRPr>
+              <a:t>践行</a:t>
+            </a:r>
+            <a:r>
+              <a:rPr lang="zh-CN" altLang="en-US" dirty="0" smtClean="0"/>
+              <a:t>法则</a:t>
+            </a:r>
+            <a:endParaRPr lang="en-US" dirty="0"/>
           </a:p>
         </p:txBody>
       </p:sp>
@@ -10411,164 +10573,104 @@
             <p:ph idx="1"/>
           </p:nvPr>
         </p:nvSpPr>
-        <p:spPr>
-          <a:xfrm>
-            <a:off x="1451579" y="2015732"/>
-            <a:ext cx="9687476" cy="3981307"/>
-          </a:xfrm>
-        </p:spPr>
+        <p:spPr/>
         <p:txBody>
           <a:bodyPr>
-            <a:normAutofit fontScale="77500" lnSpcReduction="20000"/>
+            <a:normAutofit/>
           </a:bodyPr>
           <a:lstStyle/>
           <a:p>
             <a:r>
               <a:rPr lang="zh-CN" altLang="en-US" dirty="0" smtClean="0"/>
-              <a:t>架构师</a:t>
+              <a:t>关于选择的法则</a:t>
+            </a:r>
+            <a:r>
+              <a:rPr lang="is-IS" altLang="zh-CN" dirty="0" smtClean="0"/>
+              <a:t>…</a:t>
+            </a:r>
+            <a:endParaRPr lang="en-US" altLang="zh-CN" dirty="0" smtClean="0"/>
+          </a:p>
+          <a:p>
+            <a:pPr lvl="1"/>
+            <a:r>
+              <a:rPr lang="zh-CN" altLang="en-US" dirty="0" smtClean="0"/>
+              <a:t>离开舒适区，处理好痛苦，而不是逃避痛苦</a:t>
+            </a:r>
+            <a:endParaRPr lang="en-US" altLang="zh-CN" dirty="0" smtClean="0"/>
+          </a:p>
+          <a:p>
+            <a:pPr lvl="1"/>
+            <a:r>
+              <a:rPr lang="zh-CN" altLang="en-US" dirty="0" smtClean="0"/>
+              <a:t>对自己诚实，直面现实，而不逃避现实</a:t>
+            </a:r>
+            <a:endParaRPr lang="en-US" altLang="zh-CN" dirty="0" smtClean="0"/>
+          </a:p>
+          <a:p>
+            <a:pPr lvl="1"/>
+            <a:r>
+              <a:rPr lang="zh-CN" altLang="en-US" dirty="0" smtClean="0"/>
+              <a:t>抛开面子，追求好的目标，而不是好的表现</a:t>
+            </a:r>
+            <a:endParaRPr lang="en-US" altLang="zh-CN" dirty="0" smtClean="0"/>
+          </a:p>
+          <a:p>
+            <a:pPr lvl="1"/>
+            <a:r>
+              <a:rPr lang="zh-CN" altLang="en-US" dirty="0" smtClean="0"/>
+              <a:t>平衡短期与长期，基于长期效益做决策，而不是只看短期利益</a:t>
+            </a:r>
+            <a:endParaRPr lang="en-US" altLang="zh-CN" dirty="0" smtClean="0"/>
+          </a:p>
+          <a:p>
+            <a:pPr lvl="1"/>
+            <a:r>
+              <a:rPr lang="zh-CN" altLang="en-US" dirty="0" smtClean="0"/>
+              <a:t>对自己负责，对自己做事的结果负责，而不是将责任推给他人</a:t>
+            </a:r>
+            <a:endParaRPr lang="en-US" altLang="zh-CN" dirty="0"/>
+          </a:p>
+          <a:p>
+            <a:pPr lvl="1"/>
+            <a:endParaRPr lang="en-US" altLang="zh-CN" dirty="0"/>
+          </a:p>
+          <a:p>
+            <a:pPr marL="457200" lvl="1" indent="0">
+              <a:buNone/>
+            </a:pPr>
+            <a:r>
+              <a:rPr lang="zh-CN" altLang="en-US" dirty="0" smtClean="0"/>
+              <a:t>以上法则摘自 </a:t>
             </a:r>
             <a:r>
               <a:rPr lang="en-US" altLang="zh-CN" dirty="0" smtClean="0"/>
-              <a:t> (Architect) </a:t>
-            </a:r>
-            <a:r>
-              <a:rPr lang="zh-CN" altLang="en-US" dirty="0" smtClean="0"/>
-              <a:t>的价值</a:t>
+              <a:t>《</a:t>
+            </a:r>
+            <a:r>
+              <a:rPr lang="en-US" altLang="zh-CN" dirty="0" smtClean="0">
+                <a:hlinkClick r:id="rId2"/>
+              </a:rPr>
+              <a:t>PRINCIPLES</a:t>
+            </a:r>
+            <a:r>
+              <a:rPr lang="en-US" altLang="zh-CN" dirty="0" smtClean="0"/>
+              <a:t>》 by </a:t>
+            </a:r>
+            <a:r>
+              <a:rPr lang="en-US" altLang="zh-CN" dirty="0" smtClean="0">
+                <a:hlinkClick r:id="rId3"/>
+              </a:rPr>
+              <a:t>Ray </a:t>
+            </a:r>
+            <a:r>
+              <a:rPr lang="en-US" altLang="zh-CN" dirty="0" err="1" smtClean="0">
+                <a:hlinkClick r:id="rId3"/>
+              </a:rPr>
+              <a:t>Dalio</a:t>
             </a:r>
             <a:endParaRPr lang="en-US" altLang="zh-CN" dirty="0" smtClean="0"/>
           </a:p>
           <a:p>
-            <a:pPr lvl="1"/>
-            <a:r>
-              <a:rPr lang="zh-CN" altLang="en-US" dirty="0" smtClean="0"/>
-              <a:t>技术深度</a:t>
-            </a:r>
-            <a:endParaRPr lang="en-US" altLang="zh-CN" dirty="0" smtClean="0"/>
-          </a:p>
-          <a:p>
-            <a:pPr lvl="2"/>
-            <a:r>
-              <a:rPr lang="zh-CN" altLang="en-US" dirty="0" smtClean="0"/>
-              <a:t>继续保持深入到细节的能力</a:t>
-            </a:r>
-            <a:endParaRPr lang="en-US" altLang="zh-CN" dirty="0" smtClean="0"/>
-          </a:p>
-          <a:p>
-            <a:pPr lvl="2"/>
-            <a:r>
-              <a:rPr lang="zh-CN" altLang="en-US" dirty="0" smtClean="0"/>
-              <a:t>帮助团队解决实际问题的能力</a:t>
-            </a:r>
-            <a:endParaRPr lang="en-US" altLang="zh-CN" dirty="0" smtClean="0"/>
-          </a:p>
-          <a:p>
-            <a:pPr lvl="1"/>
-            <a:r>
-              <a:rPr lang="zh-CN" altLang="en-US" dirty="0" smtClean="0"/>
-              <a:t>技术高度和广度</a:t>
-            </a:r>
-            <a:endParaRPr lang="en-US" altLang="zh-CN" dirty="0" smtClean="0"/>
-          </a:p>
-          <a:p>
-            <a:pPr lvl="2"/>
-            <a:r>
-              <a:rPr lang="zh-CN" altLang="en-US" dirty="0" smtClean="0"/>
-              <a:t>做软件</a:t>
-            </a:r>
-            <a:r>
-              <a:rPr lang="zh-CN" altLang="en-US" dirty="0"/>
-              <a:t>架构的</a:t>
-            </a:r>
-            <a:r>
-              <a:rPr lang="zh-CN" altLang="en-US" dirty="0" smtClean="0"/>
-              <a:t>主人，规则和秩序的建立者和维护者</a:t>
-            </a:r>
-            <a:endParaRPr lang="en-US" altLang="zh-CN" dirty="0" smtClean="0"/>
-          </a:p>
-          <a:p>
-            <a:pPr lvl="2"/>
-            <a:r>
-              <a:rPr lang="zh-CN" altLang="en-US" dirty="0"/>
-              <a:t>拥有战略思考能力，把握行业和领域的发展</a:t>
-            </a:r>
-            <a:r>
-              <a:rPr lang="zh-CN" altLang="en-US" dirty="0" smtClean="0"/>
-              <a:t>方向</a:t>
-            </a:r>
-            <a:endParaRPr lang="en-US" altLang="zh-CN" dirty="0" smtClean="0"/>
-          </a:p>
-          <a:p>
-            <a:pPr lvl="2"/>
-            <a:r>
-              <a:rPr lang="zh-CN" altLang="en-US" dirty="0" smtClean="0"/>
-              <a:t>做产品的主人，产品发展和竞争力的规划者</a:t>
-            </a:r>
-            <a:endParaRPr lang="en-US" altLang="zh-CN" dirty="0" smtClean="0"/>
-          </a:p>
-          <a:p>
-            <a:pPr lvl="1"/>
-            <a:r>
-              <a:rPr lang="zh-CN" altLang="en-US" dirty="0" smtClean="0"/>
-              <a:t>影响力</a:t>
-            </a:r>
-            <a:endParaRPr lang="en-US" altLang="zh-CN" dirty="0" smtClean="0"/>
-          </a:p>
-          <a:p>
-            <a:pPr lvl="2"/>
-            <a:r>
-              <a:rPr lang="zh-CN" altLang="en-US" dirty="0" smtClean="0"/>
-              <a:t>对所属技术团队的影响力</a:t>
-            </a:r>
-            <a:endParaRPr lang="en-US" altLang="zh-CN" dirty="0" smtClean="0"/>
-          </a:p>
-          <a:p>
-            <a:pPr lvl="2"/>
-            <a:r>
-              <a:rPr lang="zh-CN" altLang="en-US" dirty="0"/>
-              <a:t>对</a:t>
-            </a:r>
-            <a:r>
-              <a:rPr lang="zh-CN" altLang="en-US" dirty="0" smtClean="0"/>
-              <a:t>管理层的影响力</a:t>
-            </a:r>
-            <a:endParaRPr lang="en-US" altLang="zh-CN" dirty="0" smtClean="0"/>
-          </a:p>
-          <a:p>
-            <a:pPr lvl="2"/>
-            <a:r>
-              <a:rPr lang="zh-CN" altLang="en-US" dirty="0" smtClean="0"/>
-              <a:t>与其它公司，客户，销售，市场，产品经理，技术支持，其它技术团队等不同背景的人高效沟通的能力</a:t>
-            </a:r>
-            <a:endParaRPr lang="en-US" altLang="zh-CN" dirty="0" smtClean="0"/>
-          </a:p>
-          <a:p>
-            <a:r>
-              <a:rPr lang="zh-CN" altLang="en-US" dirty="0"/>
-              <a:t>个人贡献者</a:t>
-            </a:r>
-            <a:r>
-              <a:rPr lang="en-US" altLang="zh-CN" dirty="0"/>
-              <a:t> (Individual Contributor) </a:t>
-            </a:r>
-            <a:r>
-              <a:rPr lang="zh-CN" altLang="en-US" dirty="0"/>
-              <a:t>的价值</a:t>
-            </a:r>
-            <a:endParaRPr lang="en-US" altLang="zh-CN" dirty="0"/>
-          </a:p>
-          <a:p>
-            <a:pPr lvl="1"/>
-            <a:r>
-              <a:rPr lang="zh-CN" altLang="en-US" dirty="0" smtClean="0"/>
-              <a:t>领域知识？算法？</a:t>
-            </a:r>
-            <a:endParaRPr lang="en-US" altLang="zh-CN" dirty="0"/>
-          </a:p>
-          <a:p>
-            <a:endParaRPr lang="en-US" altLang="zh-CN" dirty="0" smtClean="0"/>
-          </a:p>
-          <a:p>
-            <a:pPr lvl="2"/>
             <a:endParaRPr lang="en-US" altLang="zh-CN" dirty="0" smtClean="0"/>
           </a:p>
         </p:txBody>
@@ -10576,7 +10678,7 @@
     </p:spTree>
     <p:extLst>
       <p:ext uri="{BB962C8B-B14F-4D97-AF65-F5344CB8AC3E}">
-        <p14:creationId xmlns:p14="http://schemas.microsoft.com/office/powerpoint/2010/main" val="1637498730"/>
+        <p14:creationId xmlns:p14="http://schemas.microsoft.com/office/powerpoint/2010/main" val="1002809798"/>
       </p:ext>
     </p:extLst>
   </p:cSld>
@@ -10626,8 +10728,16 @@
           <a:lstStyle/>
           <a:p>
             <a:r>
-              <a:rPr lang="zh-CN" altLang="en-US" dirty="0" smtClean="0"/>
-              <a:t>我的认知</a:t>
+              <a:rPr lang="zh-CN" altLang="en-US" dirty="0" smtClean="0">
+                <a:solidFill>
+                  <a:srgbClr val="FF0000"/>
+                </a:solidFill>
+              </a:rPr>
+              <a:t>交付</a:t>
+            </a:r>
+            <a:r>
+              <a:rPr lang="zh-CN" altLang="en-US" dirty="0" smtClean="0"/>
+              <a:t>价值</a:t>
             </a:r>
             <a:endParaRPr lang="en-US" dirty="0"/>
           </a:p>
@@ -10643,51 +10753,172 @@
             <p:ph idx="1"/>
           </p:nvPr>
         </p:nvSpPr>
-        <p:spPr/>
+        <p:spPr>
+          <a:xfrm>
+            <a:off x="1451579" y="2015732"/>
+            <a:ext cx="9687476" cy="3981307"/>
+          </a:xfrm>
+        </p:spPr>
         <p:txBody>
-          <a:bodyPr/>
+          <a:bodyPr>
+            <a:normAutofit fontScale="77500" lnSpcReduction="20000"/>
+          </a:bodyPr>
           <a:lstStyle/>
           <a:p>
             <a:r>
               <a:rPr lang="zh-CN" altLang="en-US" dirty="0" smtClean="0"/>
-              <a:t>过去</a:t>
+              <a:t>架构师</a:t>
+            </a:r>
+            <a:r>
+              <a:rPr lang="en-US" altLang="zh-CN" dirty="0" smtClean="0"/>
+              <a:t> (Architect) </a:t>
+            </a:r>
+            <a:r>
+              <a:rPr lang="zh-CN" altLang="en-US" dirty="0" smtClean="0"/>
+              <a:t>的价值</a:t>
             </a:r>
             <a:endParaRPr lang="en-US" altLang="zh-CN" dirty="0" smtClean="0"/>
           </a:p>
           <a:p>
-            <a:r>
-              <a:rPr lang="zh-CN" altLang="en-US" dirty="0" smtClean="0"/>
-              <a:t>现在</a:t>
+            <a:pPr lvl="1"/>
+            <a:r>
+              <a:rPr lang="zh-CN" altLang="en-US" dirty="0" smtClean="0"/>
+              <a:t>技术深度</a:t>
             </a:r>
             <a:endParaRPr lang="en-US" altLang="zh-CN" dirty="0" smtClean="0"/>
           </a:p>
           <a:p>
-            <a:r>
-              <a:rPr lang="zh-CN" altLang="en-US" dirty="0" smtClean="0">
-                <a:solidFill>
-                  <a:srgbClr val="FF0000"/>
-                </a:solidFill>
-              </a:rPr>
-              <a:t>未来</a:t>
-            </a:r>
-            <a:endParaRPr lang="en-US" altLang="zh-CN" dirty="0" smtClean="0">
-              <a:solidFill>
-                <a:srgbClr val="FF0000"/>
-              </a:solidFill>
-            </a:endParaRPr>
-          </a:p>
-          <a:p>
+            <a:pPr lvl="2"/>
+            <a:r>
+              <a:rPr lang="zh-CN" altLang="en-US" dirty="0" smtClean="0"/>
+              <a:t>继续保持深入到细节的能力</a:t>
+            </a:r>
             <a:endParaRPr lang="en-US" altLang="zh-CN" dirty="0" smtClean="0"/>
           </a:p>
           <a:p>
-            <a:endParaRPr lang="en-US" dirty="0"/>
+            <a:pPr lvl="2"/>
+            <a:r>
+              <a:rPr lang="zh-CN" altLang="en-US" dirty="0" smtClean="0"/>
+              <a:t>帮助团队解决实际问题的能力</a:t>
+            </a:r>
+            <a:endParaRPr lang="en-US" altLang="zh-CN" dirty="0" smtClean="0"/>
+          </a:p>
+          <a:p>
+            <a:pPr lvl="1"/>
+            <a:r>
+              <a:rPr lang="zh-CN" altLang="en-US" dirty="0" smtClean="0"/>
+              <a:t>技术高度和广度</a:t>
+            </a:r>
+            <a:endParaRPr lang="en-US" altLang="zh-CN" dirty="0" smtClean="0"/>
+          </a:p>
+          <a:p>
+            <a:pPr lvl="2"/>
+            <a:r>
+              <a:rPr lang="zh-CN" altLang="en-US" dirty="0" smtClean="0"/>
+              <a:t>做软件</a:t>
+            </a:r>
+            <a:r>
+              <a:rPr lang="zh-CN" altLang="en-US" dirty="0"/>
+              <a:t>架构的</a:t>
+            </a:r>
+            <a:r>
+              <a:rPr lang="zh-CN" altLang="en-US" dirty="0" smtClean="0"/>
+              <a:t>主人，规则和秩序的建立者和维护者</a:t>
+            </a:r>
+            <a:endParaRPr lang="en-US" altLang="zh-CN" dirty="0" smtClean="0"/>
+          </a:p>
+          <a:p>
+            <a:pPr lvl="2"/>
+            <a:r>
+              <a:rPr lang="zh-CN" altLang="en-US" dirty="0"/>
+              <a:t>拥有战略思考能力，把握行业和领域的发展</a:t>
+            </a:r>
+            <a:r>
+              <a:rPr lang="zh-CN" altLang="en-US" dirty="0" smtClean="0"/>
+              <a:t>方向</a:t>
+            </a:r>
+            <a:endParaRPr lang="en-US" altLang="zh-CN" dirty="0" smtClean="0"/>
+          </a:p>
+          <a:p>
+            <a:pPr lvl="2"/>
+            <a:r>
+              <a:rPr lang="zh-CN" altLang="en-US" dirty="0" smtClean="0"/>
+              <a:t>做产品的主人，产品发展和竞争力的规划者</a:t>
+            </a:r>
+            <a:endParaRPr lang="en-US" altLang="zh-CN" dirty="0" smtClean="0"/>
+          </a:p>
+          <a:p>
+            <a:pPr lvl="1"/>
+            <a:r>
+              <a:rPr lang="zh-CN" altLang="en-US" dirty="0" smtClean="0"/>
+              <a:t>影响力</a:t>
+            </a:r>
+            <a:endParaRPr lang="en-US" altLang="zh-CN" dirty="0" smtClean="0"/>
+          </a:p>
+          <a:p>
+            <a:pPr lvl="2"/>
+            <a:r>
+              <a:rPr lang="zh-CN" altLang="en-US" dirty="0" smtClean="0"/>
+              <a:t>对所属技术团队的影响力</a:t>
+            </a:r>
+            <a:endParaRPr lang="en-US" altLang="zh-CN" dirty="0" smtClean="0"/>
+          </a:p>
+          <a:p>
+            <a:pPr lvl="2"/>
+            <a:r>
+              <a:rPr lang="zh-CN" altLang="en-US" dirty="0"/>
+              <a:t>对</a:t>
+            </a:r>
+            <a:r>
+              <a:rPr lang="zh-CN" altLang="en-US" dirty="0" smtClean="0"/>
+              <a:t>管理层的影响力</a:t>
+            </a:r>
+            <a:endParaRPr lang="en-US" altLang="zh-CN" dirty="0" smtClean="0"/>
+          </a:p>
+          <a:p>
+            <a:pPr lvl="2"/>
+            <a:r>
+              <a:rPr lang="zh-CN" altLang="en-US" dirty="0" smtClean="0"/>
+              <a:t>与其它公司，客户，销售，市场，产品经理，技术支持，其它技术团队等不同背景的人高效沟通的能力</a:t>
+            </a:r>
+            <a:endParaRPr lang="en-US" altLang="zh-CN" dirty="0" smtClean="0"/>
+          </a:p>
+          <a:p>
+            <a:r>
+              <a:rPr lang="zh-CN" altLang="en-US" dirty="0"/>
+              <a:t>个人贡献者</a:t>
+            </a:r>
+            <a:r>
+              <a:rPr lang="en-US" altLang="zh-CN" dirty="0"/>
+              <a:t> (Individual Contributor) </a:t>
+            </a:r>
+            <a:r>
+              <a:rPr lang="zh-CN" altLang="en-US" dirty="0"/>
+              <a:t>的价值</a:t>
+            </a:r>
+            <a:endParaRPr lang="en-US" altLang="zh-CN" dirty="0"/>
+          </a:p>
+          <a:p>
+            <a:pPr lvl="1"/>
+            <a:r>
+              <a:rPr lang="zh-CN" altLang="en-US" dirty="0" smtClean="0"/>
+              <a:t>你写的代码的价值在哪里？领域知识？算法？</a:t>
+            </a:r>
+            <a:endParaRPr lang="en-US" altLang="zh-CN" dirty="0"/>
+          </a:p>
+          <a:p>
+            <a:endParaRPr lang="en-US" altLang="zh-CN" dirty="0" smtClean="0"/>
+          </a:p>
+          <a:p>
+            <a:pPr lvl="2"/>
+            <a:endParaRPr lang="en-US" altLang="zh-CN" dirty="0" smtClean="0"/>
           </a:p>
         </p:txBody>
       </p:sp>
     </p:spTree>
     <p:extLst>
       <p:ext uri="{BB962C8B-B14F-4D97-AF65-F5344CB8AC3E}">
-        <p14:creationId xmlns:p14="http://schemas.microsoft.com/office/powerpoint/2010/main" val="1399117749"/>
+        <p14:creationId xmlns:p14="http://schemas.microsoft.com/office/powerpoint/2010/main" val="1637498730"/>
       </p:ext>
     </p:extLst>
   </p:cSld>
@@ -10737,8 +10968,16 @@
           <a:lstStyle/>
           <a:p>
             <a:r>
-              <a:rPr lang="zh-CN" altLang="en-US" dirty="0" smtClean="0"/>
-              <a:t>成长三要素</a:t>
+              <a:rPr lang="zh-CN" altLang="en-US" dirty="0" smtClean="0">
+                <a:solidFill>
+                  <a:srgbClr val="FF0000"/>
+                </a:solidFill>
+              </a:rPr>
+              <a:t>升级</a:t>
+            </a:r>
+            <a:r>
+              <a:rPr lang="zh-CN" altLang="en-US" dirty="0" smtClean="0"/>
+              <a:t>我的职场方法论</a:t>
             </a:r>
             <a:endParaRPr lang="en-US" dirty="0"/>
           </a:p>
@@ -10754,56 +10993,117 @@
             <p:ph idx="1"/>
           </p:nvPr>
         </p:nvSpPr>
-        <p:spPr/>
+        <p:spPr>
+          <a:xfrm>
+            <a:off x="1451579" y="2015732"/>
+            <a:ext cx="9758727" cy="3815052"/>
+          </a:xfrm>
+        </p:spPr>
         <p:txBody>
-          <a:bodyPr/>
+          <a:bodyPr>
+            <a:normAutofit fontScale="77500" lnSpcReduction="20000"/>
+          </a:bodyPr>
           <a:lstStyle/>
           <a:p>
             <a:r>
               <a:rPr lang="en-US" altLang="zh-CN" dirty="0" smtClean="0"/>
-              <a:t>Value </a:t>
-            </a:r>
-            <a:r>
-              <a:rPr lang="zh-CN" altLang="en-US" dirty="0" smtClean="0"/>
-              <a:t>价值观</a:t>
+              <a:t>CPV</a:t>
+            </a:r>
+            <a:r>
+              <a:rPr lang="zh-CN" altLang="en-US" dirty="0" smtClean="0"/>
+              <a:t> － 三者间的聚焦和平衡</a:t>
             </a:r>
             <a:endParaRPr lang="en-US" altLang="zh-CN" dirty="0" smtClean="0"/>
           </a:p>
           <a:p>
             <a:pPr lvl="1"/>
             <a:r>
-              <a:rPr lang="zh-CN" altLang="en-US" dirty="0" smtClean="0"/>
-              <a:t>理想：选择和决策的方向</a:t>
+              <a:rPr lang="en-US" altLang="zh-CN" dirty="0" smtClean="0"/>
+              <a:t>Capability</a:t>
+            </a:r>
+          </a:p>
+          <a:p>
+            <a:pPr lvl="2"/>
+            <a:r>
+              <a:rPr lang="zh-CN" altLang="en-US" dirty="0" smtClean="0"/>
+              <a:t>自我升级的能力</a:t>
+            </a:r>
+            <a:endParaRPr lang="en-US" altLang="zh-CN" dirty="0"/>
+          </a:p>
+          <a:p>
+            <a:pPr lvl="2"/>
+            <a:r>
+              <a:rPr lang="zh-CN" altLang="en-US" dirty="0" smtClean="0"/>
+              <a:t>为他人提供价值的能力</a:t>
             </a:r>
             <a:endParaRPr lang="en-US" altLang="zh-CN" dirty="0" smtClean="0"/>
           </a:p>
           <a:p>
-            <a:r>
-              <a:rPr lang="en-US" dirty="0" smtClean="0"/>
-              <a:t>Principle </a:t>
-            </a:r>
-            <a:r>
-              <a:rPr lang="zh-CN" altLang="en-US" dirty="0" smtClean="0"/>
-              <a:t>法则</a:t>
+            <a:pPr lvl="1"/>
+            <a:r>
+              <a:rPr lang="en-US" altLang="zh-CN" dirty="0" smtClean="0"/>
+              <a:t>Passion</a:t>
+            </a:r>
+          </a:p>
+          <a:p>
+            <a:pPr lvl="2"/>
+            <a:r>
+              <a:rPr lang="zh-CN" altLang="en-US" dirty="0" smtClean="0"/>
+              <a:t>让自我驱动成为刚需</a:t>
+            </a:r>
+            <a:endParaRPr lang="en-US" altLang="zh-CN" dirty="0"/>
+          </a:p>
+          <a:p>
+            <a:pPr lvl="2"/>
+            <a:r>
+              <a:rPr lang="zh-CN" altLang="en-US" dirty="0" smtClean="0"/>
+              <a:t>热衷于通过改变自己而影响世界</a:t>
             </a:r>
             <a:endParaRPr lang="en-US" altLang="zh-CN" dirty="0" smtClean="0"/>
           </a:p>
           <a:p>
             <a:pPr lvl="1"/>
             <a:r>
-              <a:rPr lang="zh-CN" altLang="en-US" dirty="0" smtClean="0"/>
-              <a:t>现实：选择和决策的正确性</a:t>
+              <a:rPr lang="en-US" altLang="zh-CN" dirty="0" smtClean="0"/>
+              <a:t>Value</a:t>
+            </a:r>
+          </a:p>
+          <a:p>
+            <a:pPr lvl="2"/>
+            <a:r>
+              <a:rPr lang="zh-CN" altLang="en-US" dirty="0" smtClean="0"/>
+              <a:t>个人价值的实现</a:t>
             </a:r>
             <a:endParaRPr lang="en-US" altLang="zh-CN" dirty="0" smtClean="0"/>
           </a:p>
           <a:p>
+            <a:pPr lvl="2"/>
+            <a:r>
+              <a:rPr lang="zh-CN" altLang="en-US" dirty="0" smtClean="0"/>
+              <a:t>他人价值的实现</a:t>
+            </a:r>
+            <a:endParaRPr lang="en-US" altLang="zh-CN" dirty="0" smtClean="0"/>
+          </a:p>
+          <a:p>
+            <a:r>
+              <a:rPr lang="zh-CN" altLang="en-US" dirty="0" smtClean="0"/>
+              <a:t>为什么 </a:t>
+            </a:r>
             <a:r>
               <a:rPr lang="en-US" altLang="zh-CN" dirty="0" smtClean="0"/>
-              <a:t>Characters </a:t>
-            </a:r>
-            <a:r>
-              <a:rPr lang="zh-CN" altLang="en-US" dirty="0" smtClean="0"/>
-              <a:t>性格</a:t>
+              <a:t>CPR</a:t>
+            </a:r>
+            <a:r>
+              <a:rPr lang="zh-CN" altLang="en-US" dirty="0" smtClean="0"/>
+              <a:t> 被 </a:t>
+            </a:r>
+            <a:r>
+              <a:rPr lang="en-US" altLang="zh-CN" dirty="0" smtClean="0"/>
+              <a:t>CPV</a:t>
+            </a:r>
+            <a:r>
+              <a:rPr lang="zh-CN" altLang="en-US" dirty="0" smtClean="0"/>
+              <a:t> 所取代？</a:t>
             </a:r>
             <a:endParaRPr lang="en-US" altLang="zh-CN" dirty="0"/>
           </a:p>
@@ -10811,20 +11111,42 @@
             <a:pPr lvl="1"/>
             <a:r>
               <a:rPr lang="zh-CN" altLang="en-US" dirty="0" smtClean="0"/>
-              <a:t>落地：习惯和行动的效率</a:t>
+              <a:t>自我成长的责任是自己，不能为取悦他人而放弃自己的责任</a:t>
             </a:r>
             <a:endParaRPr lang="en-US" altLang="zh-CN" dirty="0" smtClean="0"/>
           </a:p>
           <a:p>
             <a:pPr lvl="1"/>
-            <a:endParaRPr lang="en-US" dirty="0"/>
+            <a:r>
+              <a:rPr lang="zh-CN" altLang="en-US" dirty="0" smtClean="0"/>
+              <a:t>获得认可，但不具有价值的产出，经不起时间的检验</a:t>
+            </a:r>
+            <a:endParaRPr lang="en-US" altLang="zh-CN" dirty="0" smtClean="0"/>
           </a:p>
         </p:txBody>
       </p:sp>
+      <p:graphicFrame>
+        <p:nvGraphicFramePr>
+          <p:cNvPr id="5" name="Diagram 4"/>
+          <p:cNvGraphicFramePr/>
+          <p:nvPr>
+            <p:extLst/>
+          </p:nvPr>
+        </p:nvGraphicFramePr>
+        <p:xfrm>
+          <a:off x="6013691" y="2225772"/>
+          <a:ext cx="4635018" cy="3030531"/>
+        </p:xfrm>
+        <a:graphic>
+          <a:graphicData uri="http://schemas.openxmlformats.org/drawingml/2006/diagram">
+            <dgm:relIds xmlns:dgm="http://schemas.openxmlformats.org/drawingml/2006/diagram" xmlns:r="http://schemas.openxmlformats.org/officeDocument/2006/relationships" r:dm="rId2" r:lo="rId3" r:qs="rId4" r:cs="rId5"/>
+          </a:graphicData>
+        </a:graphic>
+      </p:graphicFrame>
     </p:spTree>
     <p:extLst>
       <p:ext uri="{BB962C8B-B14F-4D97-AF65-F5344CB8AC3E}">
-        <p14:creationId xmlns:p14="http://schemas.microsoft.com/office/powerpoint/2010/main" val="1162847919"/>
+        <p14:creationId xmlns:p14="http://schemas.microsoft.com/office/powerpoint/2010/main" val="1687585922"/>
       </p:ext>
     </p:extLst>
   </p:cSld>
@@ -10875,13 +11197,7 @@
           <a:p>
             <a:r>
               <a:rPr lang="zh-CN" altLang="en-US" dirty="0" smtClean="0"/>
-              <a:t>困境是必然 － </a:t>
-            </a:r>
-            <a:r>
-              <a:rPr lang="zh-CN" altLang="en-US" dirty="0" smtClean="0">
-                <a:hlinkClick r:id="rId2"/>
-              </a:rPr>
-              <a:t>彼得原理</a:t>
+              <a:t>我的认知</a:t>
             </a:r>
             <a:endParaRPr lang="en-US" dirty="0"/>
           </a:p>
@@ -10899,203 +11215,49 @@
         </p:nvSpPr>
         <p:spPr/>
         <p:txBody>
-          <a:bodyPr>
-            <a:normAutofit fontScale="77500" lnSpcReduction="20000"/>
-          </a:bodyPr>
+          <a:bodyPr/>
           <a:lstStyle/>
           <a:p>
             <a:r>
-              <a:rPr lang="zh-CN" altLang="en-US" dirty="0"/>
-              <a:t>我们所</a:t>
-            </a:r>
-            <a:r>
-              <a:rPr lang="zh-CN" altLang="en-US" dirty="0" smtClean="0"/>
-              <a:t>面临困境</a:t>
-            </a:r>
-            <a:r>
-              <a:rPr lang="zh-CN" altLang="en-US" dirty="0"/>
-              <a:t>，通常是我们既有</a:t>
-            </a:r>
-            <a:r>
-              <a:rPr lang="zh-CN" altLang="en-US" dirty="0" smtClean="0"/>
-              <a:t>思维范式</a:t>
-            </a:r>
-            <a:r>
-              <a:rPr lang="en-US" altLang="zh-CN" dirty="0" smtClean="0"/>
-              <a:t> (</a:t>
-            </a:r>
-            <a:r>
-              <a:rPr lang="en-US" altLang="zh-CN" dirty="0" smtClean="0">
-                <a:hlinkClick r:id="rId3"/>
+              <a:rPr lang="zh-CN" altLang="en-US" dirty="0" smtClean="0"/>
+              <a:t>过去</a:t>
+            </a:r>
+            <a:endParaRPr lang="en-US" altLang="zh-CN" dirty="0" smtClean="0"/>
+          </a:p>
+          <a:p>
+            <a:r>
+              <a:rPr lang="zh-CN" altLang="en-US" dirty="0" smtClean="0"/>
+              <a:t>现在</a:t>
+            </a:r>
+            <a:endParaRPr lang="en-US" altLang="zh-CN" dirty="0" smtClean="0"/>
+          </a:p>
+          <a:p>
+            <a:r>
+              <a:rPr lang="zh-CN" altLang="en-US" dirty="0" smtClean="0">
+                <a:solidFill>
+                  <a:srgbClr val="FF0000"/>
+                </a:solidFill>
               </a:rPr>
-              <a:t>Paradigm</a:t>
-            </a:r>
-            <a:r>
-              <a:rPr lang="en-US" altLang="zh-CN" dirty="0" smtClean="0"/>
-              <a:t>)</a:t>
-            </a:r>
-            <a:r>
-              <a:rPr lang="zh-CN" altLang="en-US" dirty="0" smtClean="0"/>
-              <a:t>，</a:t>
-            </a:r>
-            <a:r>
-              <a:rPr lang="zh-CN" altLang="en-US" dirty="0"/>
-              <a:t>做事习惯的</a:t>
-            </a:r>
-            <a:r>
-              <a:rPr lang="zh-CN" altLang="en-US" dirty="0" smtClean="0"/>
-              <a:t>结果</a:t>
-            </a:r>
+              <a:t>未来</a:t>
+            </a:r>
+            <a:endParaRPr lang="en-US" altLang="zh-CN" dirty="0" smtClean="0">
+              <a:solidFill>
+                <a:srgbClr val="FF0000"/>
+              </a:solidFill>
+            </a:endParaRPr>
+          </a:p>
+          <a:p>
             <a:endParaRPr lang="en-US" altLang="zh-CN" dirty="0" smtClean="0"/>
           </a:p>
           <a:p>
-            <a:r>
-              <a:rPr lang="zh-CN" altLang="en-US" dirty="0" smtClean="0"/>
-              <a:t>以我的困境为例</a:t>
-            </a:r>
-            <a:endParaRPr lang="en-US" altLang="zh-CN" dirty="0" smtClean="0"/>
-          </a:p>
-          <a:p>
-            <a:pPr lvl="1"/>
-            <a:r>
-              <a:rPr lang="en-US" altLang="zh-CN" dirty="0" smtClean="0"/>
-              <a:t>Value </a:t>
-            </a:r>
-            <a:r>
-              <a:rPr lang="zh-CN" altLang="en-US" dirty="0" smtClean="0"/>
-              <a:t>价值观</a:t>
-            </a:r>
-            <a:endParaRPr lang="en-US" altLang="zh-CN" dirty="0" smtClean="0"/>
-          </a:p>
-          <a:p>
-            <a:pPr lvl="2"/>
-            <a:r>
-              <a:rPr lang="zh-CN" altLang="en-US" dirty="0" smtClean="0"/>
-              <a:t>对自己的价值观缺少深入思考和总结，导致</a:t>
-            </a:r>
-            <a:r>
-              <a:rPr lang="zh-CN" altLang="en-US" dirty="0"/>
-              <a:t>价值观</a:t>
-            </a:r>
-            <a:r>
-              <a:rPr lang="zh-CN" altLang="en-US" dirty="0" smtClean="0"/>
-              <a:t>混乱。</a:t>
-            </a:r>
-            <a:endParaRPr lang="en-US" altLang="zh-CN" dirty="0" smtClean="0"/>
-          </a:p>
-          <a:p>
-            <a:pPr lvl="2"/>
-            <a:r>
-              <a:rPr lang="zh-CN" altLang="en-US" dirty="0" smtClean="0"/>
-              <a:t>出现</a:t>
-            </a:r>
-            <a:r>
-              <a:rPr lang="zh-CN" altLang="en-US" dirty="0"/>
-              <a:t>重大选择时</a:t>
-            </a:r>
-            <a:r>
-              <a:rPr lang="zh-CN" altLang="en-US" dirty="0" smtClean="0"/>
-              <a:t>，反复地处于矛盾和纠结。</a:t>
-            </a:r>
-            <a:endParaRPr lang="en-US" altLang="zh-CN" dirty="0" smtClean="0"/>
-          </a:p>
-          <a:p>
-            <a:pPr lvl="1"/>
-            <a:r>
-              <a:rPr lang="en-US" dirty="0" smtClean="0"/>
-              <a:t>Principle </a:t>
-            </a:r>
-            <a:r>
-              <a:rPr lang="zh-CN" altLang="en-US" dirty="0" smtClean="0"/>
-              <a:t>法则</a:t>
-            </a:r>
-            <a:endParaRPr lang="en-US" altLang="zh-CN" dirty="0" smtClean="0"/>
-          </a:p>
-          <a:p>
-            <a:pPr lvl="2"/>
-            <a:r>
-              <a:rPr lang="zh-CN" altLang="en-US" dirty="0" smtClean="0"/>
-              <a:t>没有笃信或者坚持自己生活中的法则，跟着感觉走，相信</a:t>
-            </a:r>
-            <a:r>
-              <a:rPr lang="en-US" altLang="zh-CN" dirty="0" smtClean="0"/>
-              <a:t> follow your heart</a:t>
-            </a:r>
-            <a:r>
-              <a:rPr lang="zh-CN" altLang="en-US" dirty="0" smtClean="0"/>
-              <a:t>。</a:t>
-            </a:r>
-            <a:endParaRPr lang="en-US" altLang="zh-CN" dirty="0" smtClean="0"/>
-          </a:p>
-          <a:p>
-            <a:pPr lvl="2"/>
-            <a:r>
-              <a:rPr lang="zh-CN" altLang="en-US" dirty="0" smtClean="0"/>
-              <a:t>做出重大选择时，经常被现实打脸。</a:t>
-            </a:r>
-            <a:endParaRPr lang="en-US" altLang="zh-CN" dirty="0" smtClean="0"/>
-          </a:p>
-          <a:p>
-            <a:pPr lvl="1"/>
-            <a:r>
-              <a:rPr lang="en-US" altLang="zh-CN" dirty="0" smtClean="0"/>
-              <a:t>Characters </a:t>
-            </a:r>
-            <a:r>
-              <a:rPr lang="zh-CN" altLang="en-US" dirty="0" smtClean="0"/>
-              <a:t>性格</a:t>
-            </a:r>
-            <a:endParaRPr lang="en-US" altLang="zh-CN" dirty="0"/>
-          </a:p>
-          <a:p>
-            <a:pPr lvl="2"/>
-            <a:r>
-              <a:rPr lang="zh-CN" altLang="en-US" dirty="0" smtClean="0"/>
-              <a:t>重要的习惯没有养成：读书，反省和行动。</a:t>
-            </a:r>
-            <a:endParaRPr lang="en-US" altLang="zh-CN" dirty="0"/>
-          </a:p>
-          <a:p>
-            <a:pPr lvl="2"/>
-            <a:r>
-              <a:rPr lang="zh-CN" altLang="en-US" dirty="0" smtClean="0"/>
-              <a:t>缺少</a:t>
-            </a:r>
-            <a:r>
-              <a:rPr lang="zh-CN" altLang="en-US" dirty="0" smtClean="0">
-                <a:hlinkClick r:id="rId4"/>
-              </a:rPr>
-              <a:t>元认知</a:t>
-            </a:r>
-            <a:r>
-              <a:rPr lang="en-US" altLang="zh-CN" dirty="0" smtClean="0">
-                <a:hlinkClick r:id="rId4"/>
-              </a:rPr>
-              <a:t> (Metacongnition)</a:t>
-            </a:r>
-            <a:r>
-              <a:rPr lang="en-US" altLang="zh-CN" dirty="0" smtClean="0"/>
-              <a:t> </a:t>
-            </a:r>
-            <a:r>
-              <a:rPr lang="zh-CN" altLang="en-US" dirty="0" smtClean="0"/>
-              <a:t>能力，不能做自己大脑的主人。</a:t>
-            </a:r>
-            <a:endParaRPr lang="en-US" altLang="zh-CN" dirty="0"/>
-          </a:p>
-          <a:p>
-            <a:r>
-              <a:rPr lang="zh-CN" altLang="en-US" dirty="0" smtClean="0"/>
-              <a:t>结论：仅仅靠努力和坚持没有意义，首先需要升级自己的思维范式，提升元认知能力。</a:t>
-            </a:r>
-            <a:endParaRPr lang="en-US" altLang="zh-CN" dirty="0" smtClean="0"/>
+            <a:endParaRPr lang="en-US" dirty="0"/>
           </a:p>
         </p:txBody>
       </p:sp>
     </p:spTree>
     <p:extLst>
       <p:ext uri="{BB962C8B-B14F-4D97-AF65-F5344CB8AC3E}">
-        <p14:creationId xmlns:p14="http://schemas.microsoft.com/office/powerpoint/2010/main" val="930139581"/>
+        <p14:creationId xmlns:p14="http://schemas.microsoft.com/office/powerpoint/2010/main" val="1399117749"/>
       </p:ext>
     </p:extLst>
   </p:cSld>
@@ -11146,7 +11308,25 @@
           <a:p>
             <a:r>
               <a:rPr lang="zh-CN" altLang="en-US" dirty="0" smtClean="0"/>
-              <a:t>我的方法论升级</a:t>
+              <a:t>困境是</a:t>
+            </a:r>
+            <a:r>
+              <a:rPr lang="zh-CN" altLang="en-US" dirty="0" smtClean="0">
+                <a:solidFill>
+                  <a:srgbClr val="FF0000"/>
+                </a:solidFill>
+              </a:rPr>
+              <a:t>必然 </a:t>
+            </a:r>
+            <a:r>
+              <a:rPr lang="zh-CN" altLang="en-US" dirty="0" smtClean="0"/>
+              <a:t>－ </a:t>
+            </a:r>
+            <a:r>
+              <a:rPr lang="zh-CN" altLang="en-US" dirty="0" smtClean="0">
+                <a:hlinkClick r:id="rId2"/>
+              </a:rPr>
+              <a:t>彼得原理</a:t>
             </a:r>
             <a:endParaRPr lang="en-US" dirty="0"/>
           </a:p>
@@ -11165,37 +11345,155 @@
         <p:spPr>
           <a:xfrm>
             <a:off x="1451579" y="2015732"/>
-            <a:ext cx="9758727" cy="3815052"/>
+            <a:ext cx="9818104" cy="3921930"/>
           </a:xfrm>
         </p:spPr>
         <p:txBody>
           <a:bodyPr>
-            <a:normAutofit fontScale="77500" lnSpcReduction="20000"/>
+            <a:normAutofit fontScale="70000" lnSpcReduction="20000"/>
           </a:bodyPr>
           <a:lstStyle/>
           <a:p>
             <a:r>
+              <a:rPr lang="zh-CN" altLang="en-US" dirty="0"/>
+              <a:t>我们所</a:t>
+            </a:r>
+            <a:r>
+              <a:rPr lang="zh-CN" altLang="en-US" dirty="0" smtClean="0"/>
+              <a:t>面临困境</a:t>
+            </a:r>
+            <a:r>
+              <a:rPr lang="zh-CN" altLang="en-US" dirty="0"/>
+              <a:t>，通常是我们既有</a:t>
+            </a:r>
+            <a:r>
+              <a:rPr lang="zh-CN" altLang="en-US" dirty="0" smtClean="0"/>
+              <a:t>思维范式</a:t>
+            </a:r>
+            <a:r>
               <a:rPr lang="en-US" altLang="zh-CN" dirty="0" smtClean="0"/>
-              <a:t>CPV</a:t>
-            </a:r>
-            <a:r>
-              <a:rPr lang="zh-CN" altLang="en-US" dirty="0" smtClean="0"/>
-              <a:t> － 三者间的聚焦和平衡</a:t>
+              <a:t> (</a:t>
+            </a:r>
+            <a:r>
+              <a:rPr lang="en-US" altLang="zh-CN" dirty="0" smtClean="0">
+                <a:hlinkClick r:id="rId3"/>
+              </a:rPr>
+              <a:t>Paradigm</a:t>
+            </a:r>
+            <a:r>
+              <a:rPr lang="en-US" altLang="zh-CN" dirty="0" smtClean="0"/>
+              <a:t>)</a:t>
+            </a:r>
+            <a:r>
+              <a:rPr lang="zh-CN" altLang="en-US" dirty="0" smtClean="0"/>
+              <a:t>，</a:t>
+            </a:r>
+            <a:r>
+              <a:rPr lang="zh-CN" altLang="en-US" dirty="0"/>
+              <a:t>做事习惯的</a:t>
+            </a:r>
+            <a:r>
+              <a:rPr lang="zh-CN" altLang="en-US" dirty="0" smtClean="0"/>
+              <a:t>结果</a:t>
             </a:r>
             <a:endParaRPr lang="en-US" altLang="zh-CN" dirty="0" smtClean="0"/>
           </a:p>
           <a:p>
+            <a:r>
+              <a:rPr lang="zh-CN" altLang="en-US" dirty="0" smtClean="0"/>
+              <a:t>以我的困境为例</a:t>
+            </a:r>
+            <a:endParaRPr lang="en-US" altLang="zh-CN" dirty="0" smtClean="0"/>
+          </a:p>
+          <a:p>
             <a:pPr lvl="1"/>
             <a:r>
               <a:rPr lang="en-US" altLang="zh-CN" dirty="0" smtClean="0"/>
-              <a:t>Capability</a:t>
-            </a:r>
+              <a:t>Value </a:t>
+            </a:r>
+            <a:r>
+              <a:rPr lang="zh-CN" altLang="en-US" dirty="0" smtClean="0"/>
+              <a:t>价值观</a:t>
+            </a:r>
+            <a:endParaRPr lang="en-US" altLang="zh-CN" dirty="0" smtClean="0"/>
           </a:p>
           <a:p>
             <a:pPr lvl="2"/>
             <a:r>
               <a:rPr lang="zh-CN" altLang="en-US" dirty="0" smtClean="0"/>
-              <a:t>自我升级的能力</a:t>
+              <a:t>对自己的价值观缺少深入思考和总结，导致</a:t>
+            </a:r>
+            <a:r>
+              <a:rPr lang="zh-CN" altLang="en-US" dirty="0"/>
+              <a:t>价值观</a:t>
+            </a:r>
+            <a:r>
+              <a:rPr lang="zh-CN" altLang="en-US" dirty="0" smtClean="0"/>
+              <a:t>混乱。</a:t>
+            </a:r>
+            <a:endParaRPr lang="en-US" altLang="zh-CN" dirty="0" smtClean="0"/>
+          </a:p>
+          <a:p>
+            <a:pPr lvl="2"/>
+            <a:r>
+              <a:rPr lang="zh-CN" altLang="en-US" dirty="0" smtClean="0"/>
+              <a:t>出现</a:t>
+            </a:r>
+            <a:r>
+              <a:rPr lang="zh-CN" altLang="en-US" dirty="0"/>
+              <a:t>重大选择时</a:t>
+            </a:r>
+            <a:r>
+              <a:rPr lang="zh-CN" altLang="en-US" dirty="0" smtClean="0"/>
+              <a:t>，反复地处于矛盾和纠结。</a:t>
+            </a:r>
+            <a:endParaRPr lang="en-US" altLang="zh-CN" dirty="0" smtClean="0"/>
+          </a:p>
+          <a:p>
+            <a:pPr lvl="1"/>
+            <a:r>
+              <a:rPr lang="en-US" dirty="0" smtClean="0"/>
+              <a:t>Principle </a:t>
+            </a:r>
+            <a:r>
+              <a:rPr lang="zh-CN" altLang="en-US" dirty="0" smtClean="0"/>
+              <a:t>法则</a:t>
+            </a:r>
+            <a:endParaRPr lang="en-US" altLang="zh-CN" dirty="0" smtClean="0"/>
+          </a:p>
+          <a:p>
+            <a:pPr lvl="2"/>
+            <a:r>
+              <a:rPr lang="zh-CN" altLang="en-US" dirty="0" smtClean="0"/>
+              <a:t>没有笃信或者坚持自己生活中的法则，跟着感觉走，相信</a:t>
+            </a:r>
+            <a:r>
+              <a:rPr lang="en-US" altLang="zh-CN" dirty="0" smtClean="0"/>
+              <a:t> follow your heart</a:t>
+            </a:r>
+            <a:r>
+              <a:rPr lang="zh-CN" altLang="en-US" dirty="0" smtClean="0"/>
+              <a:t>。</a:t>
+            </a:r>
+            <a:endParaRPr lang="en-US" altLang="zh-CN" dirty="0" smtClean="0"/>
+          </a:p>
+          <a:p>
+            <a:pPr lvl="2"/>
+            <a:r>
+              <a:rPr lang="zh-CN" altLang="en-US" dirty="0" smtClean="0"/>
+              <a:t>做出重大选择时，经常被现实打脸。</a:t>
+            </a:r>
+            <a:endParaRPr lang="en-US" altLang="zh-CN" dirty="0" smtClean="0"/>
+          </a:p>
+          <a:p>
+            <a:pPr lvl="1"/>
+            <a:r>
+              <a:rPr lang="en-US" altLang="zh-CN" dirty="0" smtClean="0"/>
+              <a:t>Characters </a:t>
+            </a:r>
+            <a:r>
+              <a:rPr lang="zh-CN" altLang="en-US" dirty="0" smtClean="0"/>
+              <a:t>性格</a:t>
             </a:r>
             <a:endParaRPr lang="en-US" altLang="zh-CN" dirty="0"/>
           </a:p>
@@ -11203,123 +11501,114 @@
             <a:pPr lvl="2"/>
             <a:r>
               <a:rPr lang="zh-CN" altLang="en-US" dirty="0" smtClean="0"/>
-              <a:t>为他人提供价值的能力</a:t>
+              <a:t>重要的习惯没有养成：读书，反省和行动。</a:t>
+            </a:r>
+            <a:endParaRPr lang="en-US" altLang="zh-CN" dirty="0"/>
+          </a:p>
+          <a:p>
+            <a:pPr lvl="2"/>
+            <a:r>
+              <a:rPr lang="zh-CN" altLang="en-US" dirty="0" smtClean="0"/>
+              <a:t>缺少</a:t>
+            </a:r>
+            <a:r>
+              <a:rPr lang="zh-CN" altLang="en-US" dirty="0" smtClean="0">
+                <a:hlinkClick r:id="rId4"/>
+              </a:rPr>
+              <a:t>元认知</a:t>
+            </a:r>
+            <a:r>
+              <a:rPr lang="en-US" altLang="zh-CN" dirty="0" smtClean="0">
+                <a:hlinkClick r:id="rId4"/>
+              </a:rPr>
+              <a:t> (Metacongnition)</a:t>
+            </a:r>
+            <a:r>
+              <a:rPr lang="en-US" altLang="zh-CN" dirty="0" smtClean="0"/>
+              <a:t> </a:t>
+            </a:r>
+            <a:r>
+              <a:rPr lang="zh-CN" altLang="en-US" dirty="0" smtClean="0"/>
+              <a:t>能力，不能</a:t>
+            </a:r>
+            <a:r>
+              <a:rPr lang="zh-CN" altLang="en-US" smtClean="0"/>
+              <a:t>做</a:t>
+            </a:r>
+            <a:r>
+              <a:rPr lang="zh-CN" altLang="en-US" smtClean="0"/>
+              <a:t>自己的</a:t>
+            </a:r>
+            <a:r>
+              <a:rPr lang="zh-CN" altLang="en-US" dirty="0" smtClean="0"/>
+              <a:t>主人。</a:t>
+            </a:r>
+            <a:endParaRPr lang="en-US" altLang="zh-CN" dirty="0"/>
+          </a:p>
+          <a:p>
+            <a:r>
+              <a:rPr lang="zh-CN" altLang="en-US" dirty="0" smtClean="0"/>
+              <a:t>结论：仅仅靠努力和坚持没有意义，首先需要升级自己的思维范式，提升元认知能力。</a:t>
             </a:r>
             <a:endParaRPr lang="en-US" altLang="zh-CN" dirty="0" smtClean="0"/>
           </a:p>
           <a:p>
             <a:pPr lvl="1"/>
             <a:r>
-              <a:rPr lang="en-US" altLang="zh-CN" dirty="0" smtClean="0"/>
-              <a:t>Passion</a:t>
-            </a:r>
-          </a:p>
-          <a:p>
-            <a:pPr lvl="2"/>
-            <a:r>
-              <a:rPr lang="zh-CN" altLang="en-US" dirty="0" smtClean="0"/>
-              <a:t>让自我驱动成为刚需</a:t>
-            </a:r>
-            <a:endParaRPr lang="en-US" altLang="zh-CN" dirty="0"/>
-          </a:p>
-          <a:p>
-            <a:pPr lvl="2"/>
-            <a:r>
-              <a:rPr lang="zh-CN" altLang="en-US" dirty="0" smtClean="0"/>
-              <a:t>热衷于通过改变自己而影响世界</a:t>
-            </a:r>
-            <a:endParaRPr lang="en-US" altLang="zh-CN" dirty="0" smtClean="0"/>
+              <a:rPr lang="zh-CN" altLang="en-US" dirty="0"/>
+              <a:t>改变我们的思考方式方法，即</a:t>
+            </a:r>
+            <a:r>
+              <a:rPr lang="zh-CN" altLang="en-US" dirty="0" smtClean="0"/>
+              <a:t>个人范式 </a:t>
+            </a:r>
+            <a:r>
+              <a:rPr lang="en-US" altLang="zh-CN" dirty="0"/>
+              <a:t>(Personal Paradigm)</a:t>
+            </a:r>
+            <a:r>
+              <a:rPr lang="zh-CN" altLang="en-US" dirty="0"/>
+              <a:t>，建立以法则 </a:t>
+            </a:r>
+            <a:r>
+              <a:rPr lang="en-US" altLang="zh-CN" dirty="0"/>
+              <a:t>(Principle) </a:t>
+            </a:r>
+            <a:r>
+              <a:rPr lang="zh-CN" altLang="en-US" dirty="0"/>
+              <a:t>为中心的个人范式</a:t>
+            </a:r>
           </a:p>
           <a:p>
             <a:pPr lvl="1"/>
             <a:r>
-              <a:rPr lang="en-US" altLang="zh-CN" dirty="0" smtClean="0"/>
-              <a:t>Value</a:t>
-            </a:r>
-          </a:p>
-          <a:p>
-            <a:pPr lvl="2"/>
-            <a:r>
-              <a:rPr lang="zh-CN" altLang="en-US" dirty="0" smtClean="0"/>
-              <a:t>个人价值的实现</a:t>
-            </a:r>
-            <a:endParaRPr lang="en-US" altLang="zh-CN" dirty="0" smtClean="0"/>
-          </a:p>
-          <a:p>
-            <a:pPr lvl="2"/>
-            <a:r>
-              <a:rPr lang="zh-CN" altLang="en-US" dirty="0" smtClean="0"/>
-              <a:t>他人价值的实现</a:t>
-            </a:r>
-            <a:endParaRPr lang="en-US" altLang="zh-CN" dirty="0" smtClean="0"/>
-          </a:p>
-          <a:p>
-            <a:r>
-              <a:rPr lang="zh-CN" altLang="en-US" dirty="0" smtClean="0"/>
-              <a:t>为什么 </a:t>
-            </a:r>
-            <a:r>
-              <a:rPr lang="en-US" altLang="zh-CN" dirty="0" smtClean="0"/>
-              <a:t>Recognition</a:t>
-            </a:r>
-            <a:r>
-              <a:rPr lang="zh-CN" altLang="en-US" dirty="0" smtClean="0"/>
-              <a:t> 被 </a:t>
-            </a:r>
-            <a:r>
-              <a:rPr lang="en-US" altLang="zh-CN" dirty="0" smtClean="0"/>
-              <a:t>Value</a:t>
-            </a:r>
-            <a:r>
-              <a:rPr lang="zh-CN" altLang="en-US" dirty="0" smtClean="0"/>
-              <a:t> 取代？</a:t>
-            </a:r>
-            <a:endParaRPr lang="en-US" altLang="zh-CN" dirty="0"/>
-          </a:p>
-          <a:p>
-            <a:pPr lvl="1"/>
-            <a:r>
-              <a:rPr lang="zh-CN" altLang="en-US" dirty="0" smtClean="0"/>
-              <a:t>自我成长的责任是自己，不能为取悦他人而放弃自己的责任</a:t>
-            </a:r>
-            <a:endParaRPr lang="en-US" altLang="zh-CN" dirty="0" smtClean="0"/>
-          </a:p>
-          <a:p>
-            <a:pPr lvl="1"/>
-            <a:r>
-              <a:rPr lang="zh-CN" altLang="en-US" dirty="0" smtClean="0"/>
-              <a:t>参考笃信法则</a:t>
+              <a:rPr lang="zh-CN" altLang="en-US" dirty="0"/>
+              <a:t>改变我们的性格 </a:t>
+            </a:r>
+            <a:r>
+              <a:rPr lang="en-US" altLang="zh-CN" dirty="0"/>
+              <a:t>(Character)</a:t>
+            </a:r>
+            <a:r>
+              <a:rPr lang="zh-CN" altLang="en-US" dirty="0"/>
+              <a:t>，基于法则 </a:t>
+            </a:r>
+            <a:r>
+              <a:rPr lang="en-US" altLang="zh-CN" dirty="0"/>
+              <a:t>(Principle) </a:t>
+            </a:r>
+            <a:r>
+              <a:rPr lang="zh-CN" altLang="en-US" dirty="0"/>
+              <a:t>去塑造优秀的品质和习惯</a:t>
             </a:r>
             <a:endParaRPr lang="en-US" altLang="zh-CN" dirty="0" smtClean="0"/>
           </a:p>
         </p:txBody>
       </p:sp>
-      <p:graphicFrame>
-        <p:nvGraphicFramePr>
-          <p:cNvPr id="5" name="Diagram 4"/>
-          <p:cNvGraphicFramePr/>
-          <p:nvPr>
-            <p:extLst>
-              <p:ext uri="{D42A27DB-BD31-4B8C-83A1-F6EECF244321}">
-                <p14:modId xmlns:p14="http://schemas.microsoft.com/office/powerpoint/2010/main" val="735493254"/>
-              </p:ext>
-            </p:extLst>
-          </p:nvPr>
-        </p:nvGraphicFramePr>
-        <p:xfrm>
-          <a:off x="6013691" y="2225772"/>
-          <a:ext cx="4635018" cy="3030531"/>
-        </p:xfrm>
-        <a:graphic>
-          <a:graphicData uri="http://schemas.openxmlformats.org/drawingml/2006/diagram">
-            <dgm:relIds xmlns:dgm="http://schemas.openxmlformats.org/drawingml/2006/diagram" xmlns:r="http://schemas.openxmlformats.org/officeDocument/2006/relationships" r:dm="rId2" r:lo="rId3" r:qs="rId4" r:cs="rId5"/>
-          </a:graphicData>
-        </a:graphic>
-      </p:graphicFrame>
     </p:spTree>
     <p:extLst>
       <p:ext uri="{BB962C8B-B14F-4D97-AF65-F5344CB8AC3E}">
-        <p14:creationId xmlns:p14="http://schemas.microsoft.com/office/powerpoint/2010/main" val="1111753229"/>
+        <p14:creationId xmlns:p14="http://schemas.microsoft.com/office/powerpoint/2010/main" val="930139581"/>
       </p:ext>
     </p:extLst>
   </p:cSld>
@@ -11370,7 +11659,7 @@
           <a:p>
             <a:r>
               <a:rPr lang="zh-CN" altLang="en-US" dirty="0" smtClean="0"/>
-              <a:t>谢谢</a:t>
+              <a:t>结束语：职业发展是自我成长的一部分</a:t>
             </a:r>
             <a:endParaRPr lang="en-US" dirty="0"/>
           </a:p>
@@ -11880,7 +12169,7 @@
             <a:pPr lvl="1"/>
             <a:r>
               <a:rPr lang="zh-CN" altLang="en-US" dirty="0" smtClean="0"/>
-              <a:t>布朗运动 ＋ 贪婪算法</a:t>
+              <a:t>关键字：布朗运动 ＋ 贪婪算法</a:t>
             </a:r>
             <a:endParaRPr lang="en-US" altLang="zh-CN" dirty="0" smtClean="0"/>
           </a:p>
@@ -11910,8 +12199,12 @@
           <a:p>
             <a:pPr lvl="1"/>
             <a:r>
-              <a:rPr lang="zh-CN" altLang="en-US" dirty="0" smtClean="0"/>
-              <a:t>兴趣 ＋ 理想</a:t>
+              <a:rPr lang="zh-CN" altLang="en-US" dirty="0"/>
+              <a:t>关键字：兴趣 </a:t>
+            </a:r>
+            <a:r>
+              <a:rPr lang="zh-CN" altLang="en-US" dirty="0" smtClean="0"/>
+              <a:t>＋ 理想</a:t>
             </a:r>
             <a:endParaRPr lang="en-US" altLang="zh-CN" dirty="0" smtClean="0"/>
           </a:p>
@@ -11933,8 +12226,12 @@
           <a:p>
             <a:pPr lvl="1"/>
             <a:r>
-              <a:rPr lang="zh-CN" altLang="en-US" dirty="0" smtClean="0"/>
-              <a:t>迷失 ＋ 重定位</a:t>
+              <a:rPr lang="zh-CN" altLang="en-US" dirty="0"/>
+              <a:t>关键字：迷失 </a:t>
+            </a:r>
+            <a:r>
+              <a:rPr lang="zh-CN" altLang="en-US" dirty="0" smtClean="0"/>
+              <a:t>＋ 重塑</a:t>
             </a:r>
             <a:endParaRPr lang="en-US" altLang="zh-CN" dirty="0" smtClean="0"/>
           </a:p>
@@ -11994,7 +12291,7 @@
           <a:p>
             <a:r>
               <a:rPr lang="zh-CN" altLang="en-US" dirty="0" smtClean="0"/>
-              <a:t>我的方法论 </a:t>
+              <a:t>我的职场方法论 </a:t>
             </a:r>
             <a:r>
               <a:rPr lang="en-US" altLang="zh-CN" dirty="0" smtClean="0"/>
@@ -12270,8 +12567,16 @@
           <a:lstStyle/>
           <a:p>
             <a:r>
-              <a:rPr lang="zh-CN" altLang="en-US" dirty="0" smtClean="0"/>
-              <a:t>明确职位要求</a:t>
+              <a:rPr lang="zh-CN" altLang="en-US" dirty="0" smtClean="0">
+                <a:solidFill>
+                  <a:srgbClr val="FF0000"/>
+                </a:solidFill>
+              </a:rPr>
+              <a:t>理解</a:t>
+            </a:r>
+            <a:r>
+              <a:rPr lang="zh-CN" altLang="en-US" dirty="0" smtClean="0"/>
+              <a:t>需求</a:t>
             </a:r>
             <a:endParaRPr lang="en-US" dirty="0"/>
           </a:p>
@@ -12509,7 +12814,15 @@
           <a:p>
             <a:r>
               <a:rPr lang="zh-CN" altLang="en-US" dirty="0" smtClean="0"/>
-              <a:t>评估自己位置</a:t>
+              <a:t>定期</a:t>
+            </a:r>
+            <a:r>
+              <a:rPr lang="zh-CN" altLang="en-US" dirty="0" smtClean="0">
+                <a:solidFill>
+                  <a:srgbClr val="FF0000"/>
+                </a:solidFill>
+              </a:rPr>
+              <a:t>评估</a:t>
             </a:r>
             <a:endParaRPr lang="en-US" dirty="0"/>
           </a:p>
@@ -13149,21 +13462,9 @@
             </a:r>
             <a:r>
               <a:rPr lang="zh-CN" altLang="en-US" dirty="0" smtClean="0"/>
-              <a:t>做</a:t>
-            </a:r>
-            <a:r>
-              <a:rPr lang="zh-CN" altLang="en-US" dirty="0" smtClean="0">
-                <a:solidFill>
-                  <a:srgbClr val="FF0000"/>
-                </a:solidFill>
-              </a:rPr>
-              <a:t>第一</a:t>
-            </a:r>
-            <a:endParaRPr lang="en-US" dirty="0">
-              <a:solidFill>
-                <a:srgbClr val="FF0000"/>
-              </a:solidFill>
-            </a:endParaRPr>
+              <a:t>做第一</a:t>
+            </a:r>
+            <a:endParaRPr lang="en-US" dirty="0"/>
           </a:p>
         </p:txBody>
       </p:sp>

</xml_diff>

<commit_message>
update: fixed the format problem and update the last page
Signed-off-by: Yong Yang <yangoliver@gmail.com>
</commit_message>
<xml_diff>
--- a/slides/2016/career_personal_dev.pptx
+++ b/slides/2016/career_personal_dev.pptx
@@ -1890,7 +1890,7 @@
 <dgm:dataModel xmlns:dgm="http://schemas.openxmlformats.org/drawingml/2006/diagram" xmlns:a="http://schemas.openxmlformats.org/drawingml/2006/main">
   <dgm:ptLst>
     <dgm:pt modelId="{F58C2C3A-9184-E942-8884-7A1258361068}" type="doc">
-      <dgm:prSet loTypeId="urn:microsoft.com/office/officeart/2005/8/layout/venn1" loCatId="" qsTypeId="urn:microsoft.com/office/officeart/2005/8/quickstyle/simple4" qsCatId="simple" csTypeId="urn:microsoft.com/office/officeart/2005/8/colors/accent1_2" csCatId="accent1" phldr="1"/>
+      <dgm:prSet loTypeId="urn:microsoft.com/office/officeart/2005/8/layout/venn1" loCatId="" qsTypeId="urn:microsoft.com/office/officeart/2005/8/quickstyle/simple2" qsCatId="simple" csTypeId="urn:microsoft.com/office/officeart/2005/8/colors/accent1_2" csCatId="accent1" phldr="1"/>
       <dgm:spPr/>
     </dgm:pt>
     <dgm:pt modelId="{0279F204-0F2B-4F4A-B8A6-B305101486AE}">
@@ -2442,57 +2442,33 @@
         <a:prstGeom prst="ellipse">
           <a:avLst/>
         </a:prstGeom>
-        <a:gradFill rotWithShape="0">
-          <a:gsLst>
-            <a:gs pos="0">
-              <a:schemeClr val="accent1">
-                <a:alpha val="50000"/>
-                <a:hueOff val="0"/>
-                <a:satOff val="0"/>
-                <a:lumOff val="0"/>
-                <a:alphaOff val="0"/>
-                <a:tint val="98000"/>
-                <a:satMod val="110000"/>
-                <a:lumMod val="104000"/>
-              </a:schemeClr>
-            </a:gs>
-            <a:gs pos="69000">
-              <a:schemeClr val="accent1">
-                <a:alpha val="50000"/>
-                <a:hueOff val="0"/>
-                <a:satOff val="0"/>
-                <a:lumOff val="0"/>
-                <a:alphaOff val="0"/>
-                <a:shade val="88000"/>
-                <a:satMod val="130000"/>
-                <a:lumMod val="92000"/>
-              </a:schemeClr>
-            </a:gs>
-            <a:gs pos="100000">
-              <a:schemeClr val="accent1">
-                <a:alpha val="50000"/>
-                <a:hueOff val="0"/>
-                <a:satOff val="0"/>
-                <a:lumOff val="0"/>
-                <a:alphaOff val="0"/>
-                <a:shade val="78000"/>
-                <a:satMod val="130000"/>
-                <a:lumMod val="92000"/>
-              </a:schemeClr>
-            </a:gs>
-          </a:gsLst>
-          <a:lin ang="5400000" scaled="0"/>
-        </a:gradFill>
-        <a:ln>
-          <a:noFill/>
+        <a:solidFill>
+          <a:schemeClr val="accent1">
+            <a:alpha val="50000"/>
+            <a:hueOff val="0"/>
+            <a:satOff val="0"/>
+            <a:lumOff val="0"/>
+            <a:alphaOff val="0"/>
+          </a:schemeClr>
+        </a:solidFill>
+        <a:ln w="22225" cap="flat" cmpd="sng" algn="ctr">
+          <a:solidFill>
+            <a:schemeClr val="lt1">
+              <a:hueOff val="0"/>
+              <a:satOff val="0"/>
+              <a:lumOff val="0"/>
+              <a:alphaOff val="0"/>
+            </a:schemeClr>
+          </a:solidFill>
+          <a:prstDash val="solid"/>
         </a:ln>
         <a:effectLst/>
       </dsp:spPr>
       <dsp:style>
-        <a:lnRef idx="0">
+        <a:lnRef idx="3">
           <a:scrgbClr r="0" g="0" b="0"/>
         </a:lnRef>
-        <a:fillRef idx="3">
+        <a:fillRef idx="1">
           <a:scrgbClr r="0" g="0" b="0"/>
         </a:fillRef>
         <a:effectRef idx="0">
@@ -2552,57 +2528,33 @@
         <a:prstGeom prst="ellipse">
           <a:avLst/>
         </a:prstGeom>
-        <a:gradFill rotWithShape="0">
-          <a:gsLst>
-            <a:gs pos="0">
-              <a:schemeClr val="accent1">
-                <a:alpha val="50000"/>
-                <a:hueOff val="0"/>
-                <a:satOff val="0"/>
-                <a:lumOff val="0"/>
-                <a:alphaOff val="0"/>
-                <a:tint val="98000"/>
-                <a:satMod val="110000"/>
-                <a:lumMod val="104000"/>
-              </a:schemeClr>
-            </a:gs>
-            <a:gs pos="69000">
-              <a:schemeClr val="accent1">
-                <a:alpha val="50000"/>
-                <a:hueOff val="0"/>
-                <a:satOff val="0"/>
-                <a:lumOff val="0"/>
-                <a:alphaOff val="0"/>
-                <a:shade val="88000"/>
-                <a:satMod val="130000"/>
-                <a:lumMod val="92000"/>
-              </a:schemeClr>
-            </a:gs>
-            <a:gs pos="100000">
-              <a:schemeClr val="accent1">
-                <a:alpha val="50000"/>
-                <a:hueOff val="0"/>
-                <a:satOff val="0"/>
-                <a:lumOff val="0"/>
-                <a:alphaOff val="0"/>
-                <a:shade val="78000"/>
-                <a:satMod val="130000"/>
-                <a:lumMod val="92000"/>
-              </a:schemeClr>
-            </a:gs>
-          </a:gsLst>
-          <a:lin ang="5400000" scaled="0"/>
-        </a:gradFill>
-        <a:ln>
-          <a:noFill/>
+        <a:solidFill>
+          <a:schemeClr val="accent1">
+            <a:alpha val="50000"/>
+            <a:hueOff val="0"/>
+            <a:satOff val="0"/>
+            <a:lumOff val="0"/>
+            <a:alphaOff val="0"/>
+          </a:schemeClr>
+        </a:solidFill>
+        <a:ln w="22225" cap="flat" cmpd="sng" algn="ctr">
+          <a:solidFill>
+            <a:schemeClr val="lt1">
+              <a:hueOff val="0"/>
+              <a:satOff val="0"/>
+              <a:lumOff val="0"/>
+              <a:alphaOff val="0"/>
+            </a:schemeClr>
+          </a:solidFill>
+          <a:prstDash val="solid"/>
         </a:ln>
         <a:effectLst/>
       </dsp:spPr>
       <dsp:style>
-        <a:lnRef idx="0">
+        <a:lnRef idx="3">
           <a:scrgbClr r="0" g="0" b="0"/>
         </a:lnRef>
-        <a:fillRef idx="3">
+        <a:fillRef idx="1">
           <a:scrgbClr r="0" g="0" b="0"/>
         </a:fillRef>
         <a:effectRef idx="0">
@@ -2662,57 +2614,33 @@
         <a:prstGeom prst="ellipse">
           <a:avLst/>
         </a:prstGeom>
-        <a:gradFill rotWithShape="0">
-          <a:gsLst>
-            <a:gs pos="0">
-              <a:schemeClr val="accent1">
-                <a:alpha val="50000"/>
-                <a:hueOff val="0"/>
-                <a:satOff val="0"/>
-                <a:lumOff val="0"/>
-                <a:alphaOff val="0"/>
-                <a:tint val="98000"/>
-                <a:satMod val="110000"/>
-                <a:lumMod val="104000"/>
-              </a:schemeClr>
-            </a:gs>
-            <a:gs pos="69000">
-              <a:schemeClr val="accent1">
-                <a:alpha val="50000"/>
-                <a:hueOff val="0"/>
-                <a:satOff val="0"/>
-                <a:lumOff val="0"/>
-                <a:alphaOff val="0"/>
-                <a:shade val="88000"/>
-                <a:satMod val="130000"/>
-                <a:lumMod val="92000"/>
-              </a:schemeClr>
-            </a:gs>
-            <a:gs pos="100000">
-              <a:schemeClr val="accent1">
-                <a:alpha val="50000"/>
-                <a:hueOff val="0"/>
-                <a:satOff val="0"/>
-                <a:lumOff val="0"/>
-                <a:alphaOff val="0"/>
-                <a:shade val="78000"/>
-                <a:satMod val="130000"/>
-                <a:lumMod val="92000"/>
-              </a:schemeClr>
-            </a:gs>
-          </a:gsLst>
-          <a:lin ang="5400000" scaled="0"/>
-        </a:gradFill>
-        <a:ln>
-          <a:noFill/>
+        <a:solidFill>
+          <a:schemeClr val="accent1">
+            <a:alpha val="50000"/>
+            <a:hueOff val="0"/>
+            <a:satOff val="0"/>
+            <a:lumOff val="0"/>
+            <a:alphaOff val="0"/>
+          </a:schemeClr>
+        </a:solidFill>
+        <a:ln w="22225" cap="flat" cmpd="sng" algn="ctr">
+          <a:solidFill>
+            <a:schemeClr val="lt1">
+              <a:hueOff val="0"/>
+              <a:satOff val="0"/>
+              <a:lumOff val="0"/>
+              <a:alphaOff val="0"/>
+            </a:schemeClr>
+          </a:solidFill>
+          <a:prstDash val="solid"/>
         </a:ln>
         <a:effectLst/>
       </dsp:spPr>
       <dsp:style>
-        <a:lnRef idx="0">
+        <a:lnRef idx="3">
           <a:scrgbClr r="0" g="0" b="0"/>
         </a:lnRef>
-        <a:fillRef idx="3">
+        <a:fillRef idx="1">
           <a:scrgbClr r="0" g="0" b="0"/>
         </a:fillRef>
         <a:effectRef idx="0">
@@ -5548,11 +5476,11 @@
 </file>
 
 <file path=ppt/diagrams/quickStyle2.xml><?xml version="1.0" encoding="utf-8"?>
-<dgm:styleDef xmlns:dgm="http://schemas.openxmlformats.org/drawingml/2006/diagram" xmlns:a="http://schemas.openxmlformats.org/drawingml/2006/main" uniqueId="urn:microsoft.com/office/officeart/2005/8/quickstyle/simple4">
+<dgm:styleDef xmlns:dgm="http://schemas.openxmlformats.org/drawingml/2006/diagram" xmlns:a="http://schemas.openxmlformats.org/drawingml/2006/main" uniqueId="urn:microsoft.com/office/officeart/2005/8/quickstyle/simple2">
   <dgm:title val=""/>
   <dgm:desc val=""/>
   <dgm:catLst>
-    <dgm:cat type="simple" pri="10400"/>
+    <dgm:cat type="simple" pri="10200"/>
   </dgm:catLst>
   <dgm:scene3d>
     <a:camera prst="orthographicFront"/>
@@ -5566,13 +5494,13 @@
     <dgm:sp3d/>
     <dgm:txPr/>
     <dgm:style>
-      <a:lnRef idx="0">
+      <a:lnRef idx="3">
         <a:scrgbClr r="0" g="0" b="0"/>
       </a:lnRef>
-      <a:fillRef idx="3">
+      <a:fillRef idx="1">
         <a:scrgbClr r="0" g="0" b="0"/>
       </a:fillRef>
-      <a:effectRef idx="2">
+      <a:effectRef idx="1">
         <a:scrgbClr r="0" g="0" b="0"/>
       </a:effectRef>
       <a:fontRef idx="minor">
@@ -5588,13 +5516,13 @@
     <dgm:sp3d/>
     <dgm:txPr/>
     <dgm:style>
-      <a:lnRef idx="1">
+      <a:lnRef idx="3">
         <a:scrgbClr r="0" g="0" b="0"/>
       </a:lnRef>
-      <a:fillRef idx="3">
+      <a:fillRef idx="1">
         <a:scrgbClr r="0" g="0" b="0"/>
       </a:fillRef>
-      <a:effectRef idx="2">
+      <a:effectRef idx="1">
         <a:scrgbClr r="0" g="0" b="0"/>
       </a:effectRef>
       <a:fontRef idx="minor">
@@ -5610,10 +5538,10 @@
     <dgm:sp3d/>
     <dgm:txPr/>
     <dgm:style>
-      <a:lnRef idx="0">
+      <a:lnRef idx="3">
         <a:scrgbClr r="0" g="0" b="0"/>
       </a:lnRef>
-      <a:fillRef idx="3">
+      <a:fillRef idx="1">
         <a:scrgbClr r="0" g="0" b="0"/>
       </a:fillRef>
       <a:effectRef idx="0">
@@ -5632,13 +5560,13 @@
     <dgm:sp3d/>
     <dgm:txPr/>
     <dgm:style>
-      <a:lnRef idx="1">
+      <a:lnRef idx="2">
         <a:scrgbClr r="0" g="0" b="0"/>
       </a:lnRef>
-      <a:fillRef idx="3">
+      <a:fillRef idx="1">
         <a:scrgbClr r="0" g="0" b="0"/>
       </a:fillRef>
-      <a:effectRef idx="2">
+      <a:effectRef idx="1">
         <a:scrgbClr r="0" g="0" b="0"/>
       </a:effectRef>
       <a:fontRef idx="minor">
@@ -5654,13 +5582,13 @@
     <dgm:sp3d/>
     <dgm:txPr/>
     <dgm:style>
-      <a:lnRef idx="0">
+      <a:lnRef idx="3">
         <a:scrgbClr r="0" g="0" b="0"/>
       </a:lnRef>
-      <a:fillRef idx="3">
+      <a:fillRef idx="1">
         <a:scrgbClr r="0" g="0" b="0"/>
       </a:fillRef>
-      <a:effectRef idx="2">
+      <a:effectRef idx="1">
         <a:scrgbClr r="0" g="0" b="0"/>
       </a:effectRef>
       <a:fontRef idx="minor">
@@ -5676,13 +5604,13 @@
     <dgm:sp3d/>
     <dgm:txPr/>
     <dgm:style>
-      <a:lnRef idx="0">
+      <a:lnRef idx="3">
         <a:scrgbClr r="0" g="0" b="0"/>
       </a:lnRef>
-      <a:fillRef idx="3">
+      <a:fillRef idx="1">
         <a:scrgbClr r="0" g="0" b="0"/>
       </a:fillRef>
-      <a:effectRef idx="2">
+      <a:effectRef idx="1">
         <a:scrgbClr r="0" g="0" b="0"/>
       </a:effectRef>
       <a:fontRef idx="minor">
@@ -5698,13 +5626,13 @@
     <dgm:sp3d/>
     <dgm:txPr/>
     <dgm:style>
-      <a:lnRef idx="0">
+      <a:lnRef idx="3">
         <a:scrgbClr r="0" g="0" b="0"/>
       </a:lnRef>
-      <a:fillRef idx="3">
+      <a:fillRef idx="1">
         <a:scrgbClr r="0" g="0" b="0"/>
       </a:fillRef>
-      <a:effectRef idx="2">
+      <a:effectRef idx="1">
         <a:scrgbClr r="0" g="0" b="0"/>
       </a:effectRef>
       <a:fontRef idx="minor">
@@ -5720,13 +5648,13 @@
     <dgm:sp3d/>
     <dgm:txPr/>
     <dgm:style>
-      <a:lnRef idx="0">
+      <a:lnRef idx="3">
         <a:scrgbClr r="0" g="0" b="0"/>
       </a:lnRef>
-      <a:fillRef idx="3">
+      <a:fillRef idx="1">
         <a:scrgbClr r="0" g="0" b="0"/>
       </a:fillRef>
-      <a:effectRef idx="2">
+      <a:effectRef idx="1">
         <a:scrgbClr r="0" g="0" b="0"/>
       </a:effectRef>
       <a:fontRef idx="minor">
@@ -5742,13 +5670,13 @@
     <dgm:sp3d/>
     <dgm:txPr/>
     <dgm:style>
-      <a:lnRef idx="0">
+      <a:lnRef idx="3">
         <a:scrgbClr r="0" g="0" b="0"/>
       </a:lnRef>
       <a:fillRef idx="1">
         <a:scrgbClr r="0" g="0" b="0"/>
       </a:fillRef>
-      <a:effectRef idx="2">
+      <a:effectRef idx="1">
         <a:scrgbClr r="0" g="0" b="0"/>
       </a:effectRef>
       <a:fontRef idx="minor"/>
@@ -5762,13 +5690,13 @@
     <dgm:sp3d/>
     <dgm:txPr/>
     <dgm:style>
-      <a:lnRef idx="0">
+      <a:lnRef idx="3">
         <a:scrgbClr r="0" g="0" b="0"/>
       </a:lnRef>
       <a:fillRef idx="1">
         <a:scrgbClr r="0" g="0" b="0"/>
       </a:fillRef>
-      <a:effectRef idx="2">
+      <a:effectRef idx="1">
         <a:scrgbClr r="0" g="0" b="0"/>
       </a:effectRef>
       <a:fontRef idx="minor"/>
@@ -5782,13 +5710,13 @@
     <dgm:sp3d/>
     <dgm:txPr/>
     <dgm:style>
-      <a:lnRef idx="0">
+      <a:lnRef idx="3">
         <a:scrgbClr r="0" g="0" b="0"/>
       </a:lnRef>
       <a:fillRef idx="1">
         <a:scrgbClr r="0" g="0" b="0"/>
       </a:fillRef>
-      <a:effectRef idx="2">
+      <a:effectRef idx="1">
         <a:scrgbClr r="0" g="0" b="0"/>
       </a:effectRef>
       <a:fontRef idx="minor"/>
@@ -5805,10 +5733,10 @@
       <a:lnRef idx="0">
         <a:scrgbClr r="0" g="0" b="0"/>
       </a:lnRef>
-      <a:fillRef idx="3">
+      <a:fillRef idx="1">
         <a:scrgbClr r="0" g="0" b="0"/>
       </a:fillRef>
-      <a:effectRef idx="2">
+      <a:effectRef idx="1">
         <a:scrgbClr r="0" g="0" b="0"/>
       </a:effectRef>
       <a:fontRef idx="minor">
@@ -5827,10 +5755,10 @@
       <a:lnRef idx="0">
         <a:scrgbClr r="0" g="0" b="0"/>
       </a:lnRef>
-      <a:fillRef idx="3">
+      <a:fillRef idx="1">
         <a:scrgbClr r="0" g="0" b="0"/>
       </a:fillRef>
-      <a:effectRef idx="2">
+      <a:effectRef idx="1">
         <a:scrgbClr r="0" g="0" b="0"/>
       </a:effectRef>
       <a:fontRef idx="minor">
@@ -5849,10 +5777,10 @@
       <a:lnRef idx="0">
         <a:scrgbClr r="0" g="0" b="0"/>
       </a:lnRef>
-      <a:fillRef idx="3">
+      <a:fillRef idx="1">
         <a:scrgbClr r="0" g="0" b="0"/>
       </a:fillRef>
-      <a:effectRef idx="2">
+      <a:effectRef idx="1">
         <a:scrgbClr r="0" g="0" b="0"/>
       </a:effectRef>
       <a:fontRef idx="minor">
@@ -5908,13 +5836,13 @@
     <dgm:sp3d/>
     <dgm:txPr/>
     <dgm:style>
-      <a:lnRef idx="0">
+      <a:lnRef idx="3">
         <a:scrgbClr r="0" g="0" b="0"/>
       </a:lnRef>
-      <a:fillRef idx="3">
+      <a:fillRef idx="1">
         <a:scrgbClr r="0" g="0" b="0"/>
       </a:fillRef>
-      <a:effectRef idx="2">
+      <a:effectRef idx="1">
         <a:scrgbClr r="0" g="0" b="0"/>
       </a:effectRef>
       <a:fontRef idx="minor">
@@ -5930,13 +5858,13 @@
     <dgm:sp3d/>
     <dgm:txPr/>
     <dgm:style>
-      <a:lnRef idx="0">
+      <a:lnRef idx="3">
         <a:scrgbClr r="0" g="0" b="0"/>
       </a:lnRef>
-      <a:fillRef idx="3">
+      <a:fillRef idx="1">
         <a:scrgbClr r="0" g="0" b="0"/>
       </a:fillRef>
-      <a:effectRef idx="2">
+      <a:effectRef idx="1">
         <a:scrgbClr r="0" g="0" b="0"/>
       </a:effectRef>
       <a:fontRef idx="minor">
@@ -5952,13 +5880,13 @@
     <dgm:sp3d/>
     <dgm:txPr/>
     <dgm:style>
-      <a:lnRef idx="0">
+      <a:lnRef idx="3">
         <a:scrgbClr r="0" g="0" b="0"/>
       </a:lnRef>
-      <a:fillRef idx="3">
+      <a:fillRef idx="1">
         <a:scrgbClr r="0" g="0" b="0"/>
       </a:fillRef>
-      <a:effectRef idx="2">
+      <a:effectRef idx="1">
         <a:scrgbClr r="0" g="0" b="0"/>
       </a:effectRef>
       <a:fontRef idx="minor">
@@ -5974,13 +5902,13 @@
     <dgm:sp3d/>
     <dgm:txPr/>
     <dgm:style>
-      <a:lnRef idx="0">
+      <a:lnRef idx="3">
         <a:scrgbClr r="0" g="0" b="0"/>
       </a:lnRef>
-      <a:fillRef idx="3">
+      <a:fillRef idx="1">
         <a:scrgbClr r="0" g="0" b="0"/>
       </a:fillRef>
-      <a:effectRef idx="2">
+      <a:effectRef idx="1">
         <a:scrgbClr r="0" g="0" b="0"/>
       </a:effectRef>
       <a:fontRef idx="minor">
@@ -5996,13 +5924,13 @@
     <dgm:sp3d/>
     <dgm:txPr/>
     <dgm:style>
-      <a:lnRef idx="0">
+      <a:lnRef idx="3">
         <a:scrgbClr r="0" g="0" b="0"/>
       </a:lnRef>
-      <a:fillRef idx="3">
+      <a:fillRef idx="1">
         <a:scrgbClr r="0" g="0" b="0"/>
       </a:fillRef>
-      <a:effectRef idx="2">
+      <a:effectRef idx="1">
         <a:scrgbClr r="0" g="0" b="0"/>
       </a:effectRef>
       <a:fontRef idx="minor">
@@ -6018,13 +5946,13 @@
     <dgm:sp3d/>
     <dgm:txPr/>
     <dgm:style>
-      <a:lnRef idx="0">
+      <a:lnRef idx="3">
         <a:scrgbClr r="0" g="0" b="0"/>
       </a:lnRef>
-      <a:fillRef idx="3">
+      <a:fillRef idx="1">
         <a:scrgbClr r="0" g="0" b="0"/>
       </a:fillRef>
-      <a:effectRef idx="2">
+      <a:effectRef idx="1">
         <a:scrgbClr r="0" g="0" b="0"/>
       </a:effectRef>
       <a:fontRef idx="minor">
@@ -6040,13 +5968,13 @@
     <dgm:sp3d/>
     <dgm:txPr/>
     <dgm:style>
-      <a:lnRef idx="0">
+      <a:lnRef idx="3">
         <a:scrgbClr r="0" g="0" b="0"/>
       </a:lnRef>
-      <a:fillRef idx="3">
+      <a:fillRef idx="1">
         <a:scrgbClr r="0" g="0" b="0"/>
       </a:fillRef>
-      <a:effectRef idx="2">
+      <a:effectRef idx="1">
         <a:scrgbClr r="0" g="0" b="0"/>
       </a:effectRef>
       <a:fontRef idx="minor">
@@ -6062,13 +5990,13 @@
     <dgm:sp3d/>
     <dgm:txPr/>
     <dgm:style>
-      <a:lnRef idx="1">
+      <a:lnRef idx="3">
         <a:scrgbClr r="0" g="0" b="0"/>
       </a:lnRef>
-      <a:fillRef idx="3">
+      <a:fillRef idx="1">
         <a:scrgbClr r="0" g="0" b="0"/>
       </a:fillRef>
-      <a:effectRef idx="2">
+      <a:effectRef idx="1">
         <a:scrgbClr r="0" g="0" b="0"/>
       </a:effectRef>
       <a:fontRef idx="minor">
@@ -6084,13 +6012,13 @@
     <dgm:sp3d/>
     <dgm:txPr/>
     <dgm:style>
-      <a:lnRef idx="1">
+      <a:lnRef idx="3">
         <a:scrgbClr r="0" g="0" b="0"/>
       </a:lnRef>
-      <a:fillRef idx="3">
+      <a:fillRef idx="1">
         <a:scrgbClr r="0" g="0" b="0"/>
       </a:fillRef>
-      <a:effectRef idx="2">
+      <a:effectRef idx="1">
         <a:scrgbClr r="0" g="0" b="0"/>
       </a:effectRef>
       <a:fontRef idx="minor">
@@ -6106,7 +6034,7 @@
     <dgm:sp3d/>
     <dgm:txPr/>
     <dgm:style>
-      <a:lnRef idx="1">
+      <a:lnRef idx="2">
         <a:scrgbClr r="0" g="0" b="0"/>
       </a:lnRef>
       <a:fillRef idx="0">
@@ -6126,7 +6054,7 @@
     <dgm:sp3d/>
     <dgm:txPr/>
     <dgm:style>
-      <a:lnRef idx="1">
+      <a:lnRef idx="2">
         <a:scrgbClr r="0" g="0" b="0"/>
       </a:lnRef>
       <a:fillRef idx="0">
@@ -6146,7 +6074,7 @@
     <dgm:sp3d/>
     <dgm:txPr/>
     <dgm:style>
-      <a:lnRef idx="1">
+      <a:lnRef idx="2">
         <a:scrgbClr r="0" g="0" b="0"/>
       </a:lnRef>
       <a:fillRef idx="0">
@@ -6166,7 +6094,7 @@
     <dgm:sp3d/>
     <dgm:txPr/>
     <dgm:style>
-      <a:lnRef idx="1">
+      <a:lnRef idx="2">
         <a:scrgbClr r="0" g="0" b="0"/>
       </a:lnRef>
       <a:fillRef idx="0">
@@ -6186,7 +6114,7 @@
     <dgm:sp3d/>
     <dgm:txPr/>
     <dgm:style>
-      <a:lnRef idx="1">
+      <a:lnRef idx="2">
         <a:scrgbClr r="0" g="0" b="0"/>
       </a:lnRef>
       <a:fillRef idx="1">
@@ -6206,7 +6134,7 @@
     <dgm:sp3d/>
     <dgm:txPr/>
     <dgm:style>
-      <a:lnRef idx="1">
+      <a:lnRef idx="2">
         <a:scrgbClr r="0" g="0" b="0"/>
       </a:lnRef>
       <a:fillRef idx="1">
@@ -6226,7 +6154,7 @@
     <dgm:sp3d/>
     <dgm:txPr/>
     <dgm:style>
-      <a:lnRef idx="1">
+      <a:lnRef idx="2">
         <a:scrgbClr r="0" g="0" b="0"/>
       </a:lnRef>
       <a:fillRef idx="1">
@@ -6266,7 +6194,7 @@
     <dgm:sp3d/>
     <dgm:txPr/>
     <dgm:style>
-      <a:lnRef idx="1">
+      <a:lnRef idx="2">
         <a:scrgbClr r="0" g="0" b="0"/>
       </a:lnRef>
       <a:fillRef idx="1">
@@ -6286,7 +6214,7 @@
     <dgm:sp3d/>
     <dgm:txPr/>
     <dgm:style>
-      <a:lnRef idx="1">
+      <a:lnRef idx="2">
         <a:scrgbClr r="0" g="0" b="0"/>
       </a:lnRef>
       <a:fillRef idx="1">
@@ -6306,7 +6234,7 @@
     <dgm:sp3d/>
     <dgm:txPr/>
     <dgm:style>
-      <a:lnRef idx="1">
+      <a:lnRef idx="2">
         <a:scrgbClr r="0" g="0" b="0"/>
       </a:lnRef>
       <a:fillRef idx="1">
@@ -6326,7 +6254,7 @@
     <dgm:sp3d/>
     <dgm:txPr/>
     <dgm:style>
-      <a:lnRef idx="1">
+      <a:lnRef idx="2">
         <a:scrgbClr r="0" g="0" b="0"/>
       </a:lnRef>
       <a:fillRef idx="1">
@@ -6346,7 +6274,7 @@
     <dgm:sp3d/>
     <dgm:txPr/>
     <dgm:style>
-      <a:lnRef idx="1">
+      <a:lnRef idx="2">
         <a:scrgbClr r="0" g="0" b="0"/>
       </a:lnRef>
       <a:fillRef idx="1">
@@ -6366,7 +6294,7 @@
     <dgm:sp3d/>
     <dgm:txPr/>
     <dgm:style>
-      <a:lnRef idx="1">
+      <a:lnRef idx="2">
         <a:scrgbClr r="0" g="0" b="0"/>
       </a:lnRef>
       <a:fillRef idx="1">
@@ -6386,7 +6314,7 @@
     <dgm:sp3d/>
     <dgm:txPr/>
     <dgm:style>
-      <a:lnRef idx="1">
+      <a:lnRef idx="2">
         <a:scrgbClr r="0" g="0" b="0"/>
       </a:lnRef>
       <a:fillRef idx="1">
@@ -6406,7 +6334,7 @@
     <dgm:sp3d/>
     <dgm:txPr/>
     <dgm:style>
-      <a:lnRef idx="1">
+      <a:lnRef idx="2">
         <a:scrgbClr r="0" g="0" b="0"/>
       </a:lnRef>
       <a:fillRef idx="1">
@@ -6426,7 +6354,7 @@
     <dgm:sp3d/>
     <dgm:txPr/>
     <dgm:style>
-      <a:lnRef idx="1">
+      <a:lnRef idx="2">
         <a:scrgbClr r="0" g="0" b="0"/>
       </a:lnRef>
       <a:fillRef idx="1">
@@ -6446,7 +6374,7 @@
     <dgm:sp3d/>
     <dgm:txPr/>
     <dgm:style>
-      <a:lnRef idx="1">
+      <a:lnRef idx="2">
         <a:scrgbClr r="0" g="0" b="0"/>
       </a:lnRef>
       <a:fillRef idx="1">
@@ -6466,7 +6394,7 @@
     <dgm:sp3d/>
     <dgm:txPr/>
     <dgm:style>
-      <a:lnRef idx="1">
+      <a:lnRef idx="2">
         <a:scrgbClr r="0" g="0" b="0"/>
       </a:lnRef>
       <a:fillRef idx="1">
@@ -6492,7 +6420,7 @@
       <a:fillRef idx="1">
         <a:scrgbClr r="0" g="0" b="0"/>
       </a:fillRef>
-      <a:effectRef idx="2">
+      <a:effectRef idx="0">
         <a:scrgbClr r="0" g="0" b="0"/>
       </a:effectRef>
       <a:fontRef idx="minor"/>
@@ -6512,7 +6440,7 @@
       <a:fillRef idx="1">
         <a:scrgbClr r="0" g="0" b="0"/>
       </a:fillRef>
-      <a:effectRef idx="2">
+      <a:effectRef idx="0">
         <a:scrgbClr r="0" g="0" b="0"/>
       </a:effectRef>
       <a:fontRef idx="minor"/>
@@ -6546,13 +6474,13 @@
     <dgm:sp3d/>
     <dgm:txPr/>
     <dgm:style>
-      <a:lnRef idx="0">
+      <a:lnRef idx="3">
         <a:scrgbClr r="0" g="0" b="0"/>
       </a:lnRef>
-      <a:fillRef idx="3">
+      <a:fillRef idx="1">
         <a:scrgbClr r="0" g="0" b="0"/>
       </a:fillRef>
-      <a:effectRef idx="2">
+      <a:effectRef idx="1">
         <a:scrgbClr r="0" g="0" b="0"/>
       </a:effectRef>
       <a:fontRef idx="minor"/>
@@ -6720,7 +6648,7 @@
           <a:p>
             <a:fld id="{48A87A34-81AB-432B-8DAE-1953F412C126}" type="datetimeFigureOut">
               <a:rPr lang="en-US" smtClean="0"/>
-              <a:t>1/3/17</a:t>
+              <a:t>1/6/17</a:t>
             </a:fld>
             <a:endParaRPr lang="en-US" dirty="0"/>
           </a:p>
@@ -6931,7 +6859,7 @@
           <a:p>
             <a:fld id="{48A87A34-81AB-432B-8DAE-1953F412C126}" type="datetimeFigureOut">
               <a:rPr lang="en-US" smtClean="0"/>
-              <a:t>1/3/17</a:t>
+              <a:t>1/6/17</a:t>
             </a:fld>
             <a:endParaRPr lang="en-US" dirty="0"/>
           </a:p>
@@ -7146,7 +7074,7 @@
           <a:p>
             <a:fld id="{48A87A34-81AB-432B-8DAE-1953F412C126}" type="datetimeFigureOut">
               <a:rPr lang="en-US" smtClean="0"/>
-              <a:t>1/3/17</a:t>
+              <a:t>1/6/17</a:t>
             </a:fld>
             <a:endParaRPr lang="en-US" dirty="0"/>
           </a:p>
@@ -7347,7 +7275,7 @@
           <a:p>
             <a:fld id="{48A87A34-81AB-432B-8DAE-1953F412C126}" type="datetimeFigureOut">
               <a:rPr lang="en-US" smtClean="0"/>
-              <a:t>1/3/17</a:t>
+              <a:t>1/6/17</a:t>
             </a:fld>
             <a:endParaRPr lang="en-US" dirty="0"/>
           </a:p>
@@ -7626,7 +7554,7 @@
           <a:p>
             <a:fld id="{48A87A34-81AB-432B-8DAE-1953F412C126}" type="datetimeFigureOut">
               <a:rPr lang="en-US" smtClean="0"/>
-              <a:t>1/3/17</a:t>
+              <a:t>1/6/17</a:t>
             </a:fld>
             <a:endParaRPr lang="en-US" dirty="0"/>
           </a:p>
@@ -7894,7 +7822,7 @@
           <a:p>
             <a:fld id="{48A87A34-81AB-432B-8DAE-1953F412C126}" type="datetimeFigureOut">
               <a:rPr lang="en-US" smtClean="0"/>
-              <a:t>1/3/17</a:t>
+              <a:t>1/6/17</a:t>
             </a:fld>
             <a:endParaRPr lang="en-US" dirty="0"/>
           </a:p>
@@ -8310,7 +8238,7 @@
           <a:p>
             <a:fld id="{48A87A34-81AB-432B-8DAE-1953F412C126}" type="datetimeFigureOut">
               <a:rPr lang="en-US" smtClean="0"/>
-              <a:t>1/3/17</a:t>
+              <a:t>1/6/17</a:t>
             </a:fld>
             <a:endParaRPr lang="en-US" dirty="0"/>
           </a:p>
@@ -8459,7 +8387,7 @@
           <a:p>
             <a:fld id="{48A87A34-81AB-432B-8DAE-1953F412C126}" type="datetimeFigureOut">
               <a:rPr lang="en-US" smtClean="0"/>
-              <a:t>1/3/17</a:t>
+              <a:t>1/6/17</a:t>
             </a:fld>
             <a:endParaRPr lang="en-US" dirty="0"/>
           </a:p>
@@ -8585,7 +8513,7 @@
           <a:p>
             <a:fld id="{48A87A34-81AB-432B-8DAE-1953F412C126}" type="datetimeFigureOut">
               <a:rPr lang="en-US" smtClean="0"/>
-              <a:t>1/3/17</a:t>
+              <a:t>1/6/17</a:t>
             </a:fld>
             <a:endParaRPr lang="en-US" dirty="0"/>
           </a:p>
@@ -8836,7 +8764,7 @@
           <a:p>
             <a:fld id="{48A87A34-81AB-432B-8DAE-1953F412C126}" type="datetimeFigureOut">
               <a:rPr lang="en-US" smtClean="0"/>
-              <a:t>1/3/17</a:t>
+              <a:t>1/6/17</a:t>
             </a:fld>
             <a:endParaRPr lang="en-US" dirty="0"/>
           </a:p>
@@ -9282,7 +9210,7 @@
             <a:fld id="{48A87A34-81AB-432B-8DAE-1953F412C126}" type="datetimeFigureOut">
               <a:rPr lang="en-US" smtClean="0"/>
               <a:pPr/>
-              <a:t>1/3/17</a:t>
+              <a:t>1/6/17</a:t>
             </a:fld>
             <a:endParaRPr lang="en-US" dirty="0"/>
           </a:p>
@@ -9614,7 +9542,7 @@
             <a:fld id="{48A87A34-81AB-432B-8DAE-1953F412C126}" type="datetimeFigureOut">
               <a:rPr lang="en-US" smtClean="0"/>
               <a:pPr/>
-              <a:t>1/3/17</a:t>
+              <a:t>1/6/17</a:t>
             </a:fld>
             <a:endParaRPr lang="en-US" dirty="0"/>
           </a:p>
@@ -11130,7 +11058,11 @@
           <p:cNvPr id="5" name="Diagram 4"/>
           <p:cNvGraphicFramePr/>
           <p:nvPr>
-            <p:extLst/>
+            <p:extLst>
+              <p:ext uri="{D42A27DB-BD31-4B8C-83A1-F6EECF244321}">
+                <p14:modId xmlns:p14="http://schemas.microsoft.com/office/powerpoint/2010/main" val="1596547449"/>
+              </p:ext>
+            </p:extLst>
           </p:nvPr>
         </p:nvGraphicFramePr>
         <p:xfrm>
@@ -11533,11 +11465,7 @@
             </a:r>
             <a:r>
               <a:rPr lang="zh-CN" altLang="en-US" smtClean="0"/>
-              <a:t>做</a:t>
-            </a:r>
-            <a:r>
-              <a:rPr lang="zh-CN" altLang="en-US" smtClean="0"/>
-              <a:t>自己的</a:t>
+              <a:t>做自己的</a:t>
             </a:r>
             <a:r>
               <a:rPr lang="zh-CN" altLang="en-US" dirty="0" smtClean="0"/>
@@ -11680,9 +11608,6 @@
           <a:bodyPr/>
           <a:lstStyle/>
           <a:p>
-            <a:endParaRPr lang="en-US" dirty="0"/>
-          </a:p>
-          <a:p>
             <a:r>
               <a:rPr lang="en-US" dirty="0" smtClean="0"/>
               <a:t>“</a:t>
@@ -11695,34 +11620,95 @@
               <a:rPr lang="en-US" dirty="0" smtClean="0"/>
               <a:t>. ” </a:t>
             </a:r>
+            <a:endParaRPr lang="en-US" dirty="0"/>
           </a:p>
           <a:p>
             <a:pPr marL="0" indent="0">
               <a:buNone/>
             </a:pPr>
-            <a:endParaRPr lang="en-US" dirty="0"/>
+            <a:r>
+              <a:rPr lang="en-US" dirty="0" smtClean="0"/>
+              <a:t>							</a:t>
+            </a:r>
+            <a:r>
+              <a:rPr lang="zh-CN" altLang="en-US" dirty="0" smtClean="0"/>
+              <a:t>              </a:t>
+            </a:r>
+            <a:r>
+              <a:rPr lang="zh-CN" altLang="en-US" dirty="0" smtClean="0"/>
+              <a:t>－</a:t>
+            </a:r>
+            <a:r>
+              <a:rPr lang="en-US" dirty="0" smtClean="0"/>
+              <a:t>Mahatma Gandh</a:t>
+            </a:r>
+            <a:r>
+              <a:rPr lang="en-US" altLang="zh-CN" dirty="0" smtClean="0"/>
+              <a:t>i</a:t>
+            </a:r>
+          </a:p>
+          <a:p>
+            <a:r>
+              <a:rPr lang="en-US" dirty="0"/>
+              <a:t>God grant me the serenity to accept the things I cannot change, Courage to change the things I can</a:t>
+            </a:r>
+            <a:r>
+              <a:rPr lang="en-US" dirty="0" smtClean="0"/>
+              <a:t>,</a:t>
+            </a:r>
+            <a:r>
+              <a:rPr lang="zh-CN" altLang="en-US" dirty="0" smtClean="0"/>
+              <a:t> </a:t>
+            </a:r>
+            <a:r>
+              <a:rPr lang="en-US" dirty="0" smtClean="0"/>
+              <a:t>and </a:t>
+            </a:r>
+            <a:r>
+              <a:rPr lang="en-US" dirty="0"/>
+              <a:t>wisdom to know the </a:t>
+            </a:r>
+            <a:r>
+              <a:rPr lang="en-US" dirty="0" smtClean="0"/>
+              <a:t>difference.</a:t>
+            </a:r>
           </a:p>
           <a:p>
             <a:pPr marL="0" indent="0">
               <a:buNone/>
             </a:pPr>
             <a:r>
+              <a:rPr lang="en-US" dirty="0"/>
+              <a:t>	</a:t>
+            </a:r>
+            <a:r>
               <a:rPr lang="en-US" dirty="0" smtClean="0"/>
-              <a:t>								― </a:t>
+              <a:t>			</a:t>
             </a:r>
             <a:r>
               <a:rPr lang="en-US" dirty="0"/>
-              <a:t>Mahatma </a:t>
+              <a:t> </a:t>
             </a:r>
             <a:r>
               <a:rPr lang="en-US" dirty="0" smtClean="0"/>
-              <a:t>Gandh</a:t>
-            </a:r>
-            <a:r>
-              <a:rPr lang="en-US" altLang="zh-CN" dirty="0" smtClean="0"/>
-              <a:t>i</a:t>
-            </a:r>
-            <a:endParaRPr lang="en-US" dirty="0" smtClean="0"/>
+              <a:t>               </a:t>
+            </a:r>
+            <a:r>
+              <a:rPr lang="zh-CN" altLang="en-US" dirty="0" smtClean="0"/>
+              <a:t>－</a:t>
+            </a:r>
+            <a:r>
+              <a:rPr lang="en-US" dirty="0" smtClean="0"/>
+              <a:t>From serenity </a:t>
+            </a:r>
+            <a:r>
+              <a:rPr lang="en-US" dirty="0"/>
+              <a:t>prayer by Reinhold </a:t>
+            </a:r>
+            <a:r>
+              <a:rPr lang="en-US" dirty="0" smtClean="0"/>
+              <a:t>Niebuhr</a:t>
+            </a:r>
           </a:p>
         </p:txBody>
       </p:sp>

</xml_diff>

<commit_message>
update: a fix per other's comments
Signed-off-by: Yong Yang <yangoliver@gmail.com>
</commit_message>
<xml_diff>
--- a/slides/2016/career_personal_dev.pptx
+++ b/slides/2016/career_personal_dev.pptx
@@ -11632,11 +11632,7 @@
             </a:r>
             <a:r>
               <a:rPr lang="zh-CN" altLang="en-US" dirty="0" smtClean="0"/>
-              <a:t>              </a:t>
-            </a:r>
-            <a:r>
-              <a:rPr lang="zh-CN" altLang="en-US" dirty="0" smtClean="0"/>
-              <a:t>－</a:t>
+              <a:t>              －</a:t>
             </a:r>
             <a:r>
               <a:rPr lang="en-US" dirty="0" smtClean="0"/>
@@ -12197,7 +12193,15 @@
           <a:p>
             <a:r>
               <a:rPr lang="zh-CN" altLang="en-US" dirty="0" smtClean="0"/>
-              <a:t>最后 </a:t>
+              <a:t>最</a:t>
+            </a:r>
+            <a:r>
+              <a:rPr lang="zh-CN" altLang="en-US" dirty="0" smtClean="0"/>
+              <a:t>近</a:t>
+            </a:r>
+            <a:r>
+              <a:rPr lang="zh-CN" altLang="en-US" dirty="0" smtClean="0"/>
+              <a:t> </a:t>
             </a:r>
             <a:r>
               <a:rPr lang="en-US" altLang="zh-CN" dirty="0" smtClean="0"/>

</xml_diff>